<commit_message>
petit modif sur word et pp
</commit_message>
<xml_diff>
--- a/Le_Bon_Potager.pptx
+++ b/Le_Bon_Potager.pptx
@@ -196,7 +196,7 @@
           <a:noFill/>
           <a:extLst>
             <a:ext uri="{909E8E84-426E-40dd-AFC4-6F175D3DCCD1}">
-              <a14:hiddenFill xmlns:a14="http://schemas.microsoft.com/office/drawing/2010/main" xmlns="">
+              <a14:hiddenFill xmlns="" xmlns:a14="http://schemas.microsoft.com/office/drawing/2010/main">
                 <a:solidFill>
                   <a:srgbClr val="FFFFFF"/>
                 </a:solidFill>
@@ -256,7 +256,7 @@
             </a:ln>
             <a:extLst>
               <a:ext uri="{91240B29-F687-4f45-9708-019B960494DF}">
-                <a14:hiddenLine xmlns:a14="http://schemas.microsoft.com/office/drawing/2010/main" xmlns="" w="9525">
+                <a14:hiddenLine xmlns="" xmlns:a14="http://schemas.microsoft.com/office/drawing/2010/main" w="9525">
                   <a:solidFill>
                     <a:srgbClr val="000000"/>
                   </a:solidFill>
@@ -346,7 +346,7 @@
             </a:ln>
             <a:extLst>
               <a:ext uri="{91240B29-F687-4f45-9708-019B960494DF}">
-                <a14:hiddenLine xmlns:a14="http://schemas.microsoft.com/office/drawing/2010/main" xmlns="" w="9525">
+                <a14:hiddenLine xmlns="" xmlns:a14="http://schemas.microsoft.com/office/drawing/2010/main" w="9525">
                   <a:solidFill>
                     <a:srgbClr val="000000"/>
                   </a:solidFill>
@@ -436,7 +436,7 @@
             </a:ln>
             <a:extLst>
               <a:ext uri="{91240B29-F687-4f45-9708-019B960494DF}">
-                <a14:hiddenLine xmlns:a14="http://schemas.microsoft.com/office/drawing/2010/main" xmlns="" w="9525">
+                <a14:hiddenLine xmlns="" xmlns:a14="http://schemas.microsoft.com/office/drawing/2010/main" w="9525">
                   <a:solidFill>
                     <a:srgbClr val="000000"/>
                   </a:solidFill>
@@ -470,7 +470,7 @@
             </a:ln>
             <a:extLst>
               <a:ext uri="{91240B29-F687-4f45-9708-019B960494DF}">
-                <a14:hiddenLine xmlns:a14="http://schemas.microsoft.com/office/drawing/2010/main" xmlns="" w="9525">
+                <a14:hiddenLine xmlns="" xmlns:a14="http://schemas.microsoft.com/office/drawing/2010/main" w="9525">
                   <a:solidFill>
                     <a:srgbClr val="000000"/>
                   </a:solidFill>
@@ -560,7 +560,7 @@
             </a:ln>
             <a:extLst>
               <a:ext uri="{91240B29-F687-4f45-9708-019B960494DF}">
-                <a14:hiddenLine xmlns:a14="http://schemas.microsoft.com/office/drawing/2010/main" xmlns="" w="9525">
+                <a14:hiddenLine xmlns="" xmlns:a14="http://schemas.microsoft.com/office/drawing/2010/main" w="9525">
                   <a:solidFill>
                     <a:srgbClr val="000000"/>
                   </a:solidFill>
@@ -622,7 +622,7 @@
             </a:ln>
             <a:extLst>
               <a:ext uri="{91240B29-F687-4f45-9708-019B960494DF}">
-                <a14:hiddenLine xmlns:a14="http://schemas.microsoft.com/office/drawing/2010/main" xmlns="" w="9525">
+                <a14:hiddenLine xmlns="" xmlns:a14="http://schemas.microsoft.com/office/drawing/2010/main" w="9525">
                   <a:solidFill>
                     <a:srgbClr val="000000"/>
                   </a:solidFill>
@@ -684,7 +684,7 @@
             </a:ln>
             <a:extLst>
               <a:ext uri="{91240B29-F687-4f45-9708-019B960494DF}">
-                <a14:hiddenLine xmlns:a14="http://schemas.microsoft.com/office/drawing/2010/main" xmlns="" w="9525">
+                <a14:hiddenLine xmlns="" xmlns:a14="http://schemas.microsoft.com/office/drawing/2010/main" w="9525">
                   <a:solidFill>
                     <a:srgbClr val="000000"/>
                   </a:solidFill>
@@ -774,7 +774,7 @@
             </a:ln>
             <a:extLst>
               <a:ext uri="{91240B29-F687-4f45-9708-019B960494DF}">
-                <a14:hiddenLine xmlns:a14="http://schemas.microsoft.com/office/drawing/2010/main" xmlns="" w="9525">
+                <a14:hiddenLine xmlns="" xmlns:a14="http://schemas.microsoft.com/office/drawing/2010/main" w="9525">
                   <a:solidFill>
                     <a:srgbClr val="000000"/>
                   </a:solidFill>
@@ -836,7 +836,7 @@
             </a:ln>
             <a:extLst>
               <a:ext uri="{91240B29-F687-4f45-9708-019B960494DF}">
-                <a14:hiddenLine xmlns:a14="http://schemas.microsoft.com/office/drawing/2010/main" xmlns="" w="9525">
+                <a14:hiddenLine xmlns="" xmlns:a14="http://schemas.microsoft.com/office/drawing/2010/main" w="9525">
                   <a:solidFill>
                     <a:srgbClr val="000000"/>
                   </a:solidFill>
@@ -898,7 +898,7 @@
             </a:ln>
             <a:extLst>
               <a:ext uri="{91240B29-F687-4f45-9708-019B960494DF}">
-                <a14:hiddenLine xmlns:a14="http://schemas.microsoft.com/office/drawing/2010/main" xmlns="" w="9525">
+                <a14:hiddenLine xmlns="" xmlns:a14="http://schemas.microsoft.com/office/drawing/2010/main" w="9525">
                   <a:solidFill>
                     <a:srgbClr val="000000"/>
                   </a:solidFill>
@@ -988,7 +988,7 @@
             </a:ln>
             <a:extLst>
               <a:ext uri="{91240B29-F687-4f45-9708-019B960494DF}">
-                <a14:hiddenLine xmlns:a14="http://schemas.microsoft.com/office/drawing/2010/main" xmlns="" w="9525">
+                <a14:hiddenLine xmlns="" xmlns:a14="http://schemas.microsoft.com/office/drawing/2010/main" w="9525">
                   <a:solidFill>
                     <a:srgbClr val="000000"/>
                   </a:solidFill>
@@ -1078,7 +1078,7 @@
             </a:ln>
             <a:extLst>
               <a:ext uri="{91240B29-F687-4f45-9708-019B960494DF}">
-                <a14:hiddenLine xmlns:a14="http://schemas.microsoft.com/office/drawing/2010/main" xmlns="" w="9525">
+                <a14:hiddenLine xmlns="" xmlns:a14="http://schemas.microsoft.com/office/drawing/2010/main" w="9525">
                   <a:solidFill>
                     <a:srgbClr val="000000"/>
                   </a:solidFill>
@@ -1140,7 +1140,7 @@
             </a:ln>
             <a:extLst>
               <a:ext uri="{91240B29-F687-4f45-9708-019B960494DF}">
-                <a14:hiddenLine xmlns:a14="http://schemas.microsoft.com/office/drawing/2010/main" xmlns="" w="9525">
+                <a14:hiddenLine xmlns="" xmlns:a14="http://schemas.microsoft.com/office/drawing/2010/main" w="9525">
                   <a:solidFill>
                     <a:srgbClr val="000000"/>
                   </a:solidFill>
@@ -1250,7 +1250,7 @@
             </a:ln>
             <a:extLst>
               <a:ext uri="{91240B29-F687-4f45-9708-019B960494DF}">
-                <a14:hiddenLine xmlns:a14="http://schemas.microsoft.com/office/drawing/2010/main" xmlns="" w="9525">
+                <a14:hiddenLine xmlns="" xmlns:a14="http://schemas.microsoft.com/office/drawing/2010/main" w="9525">
                   <a:solidFill>
                     <a:srgbClr val="000000"/>
                   </a:solidFill>
@@ -1312,7 +1312,7 @@
             </a:ln>
             <a:extLst>
               <a:ext uri="{91240B29-F687-4f45-9708-019B960494DF}">
-                <a14:hiddenLine xmlns:a14="http://schemas.microsoft.com/office/drawing/2010/main" xmlns="" w="9525">
+                <a14:hiddenLine xmlns="" xmlns:a14="http://schemas.microsoft.com/office/drawing/2010/main" w="9525">
                   <a:solidFill>
                     <a:srgbClr val="000000"/>
                   </a:solidFill>
@@ -1402,7 +1402,7 @@
             </a:ln>
             <a:extLst>
               <a:ext uri="{91240B29-F687-4f45-9708-019B960494DF}">
-                <a14:hiddenLine xmlns:a14="http://schemas.microsoft.com/office/drawing/2010/main" xmlns="" w="9525">
+                <a14:hiddenLine xmlns="" xmlns:a14="http://schemas.microsoft.com/office/drawing/2010/main" w="9525">
                   <a:solidFill>
                     <a:srgbClr val="000000"/>
                   </a:solidFill>
@@ -1492,7 +1492,7 @@
             </a:ln>
             <a:extLst>
               <a:ext uri="{91240B29-F687-4f45-9708-019B960494DF}">
-                <a14:hiddenLine xmlns:a14="http://schemas.microsoft.com/office/drawing/2010/main" xmlns="" w="9525">
+                <a14:hiddenLine xmlns="" xmlns:a14="http://schemas.microsoft.com/office/drawing/2010/main" w="9525">
                   <a:solidFill>
                     <a:srgbClr val="000000"/>
                   </a:solidFill>
@@ -1554,7 +1554,7 @@
             </a:ln>
             <a:extLst>
               <a:ext uri="{91240B29-F687-4f45-9708-019B960494DF}">
-                <a14:hiddenLine xmlns:a14="http://schemas.microsoft.com/office/drawing/2010/main" xmlns="" w="9525">
+                <a14:hiddenLine xmlns="" xmlns:a14="http://schemas.microsoft.com/office/drawing/2010/main" w="9525">
                   <a:solidFill>
                     <a:srgbClr val="000000"/>
                   </a:solidFill>
@@ -1644,7 +1644,7 @@
             </a:ln>
             <a:extLst>
               <a:ext uri="{91240B29-F687-4f45-9708-019B960494DF}">
-                <a14:hiddenLine xmlns:a14="http://schemas.microsoft.com/office/drawing/2010/main" xmlns="" w="9525">
+                <a14:hiddenLine xmlns="" xmlns:a14="http://schemas.microsoft.com/office/drawing/2010/main" w="9525">
                   <a:solidFill>
                     <a:srgbClr val="000000"/>
                   </a:solidFill>
@@ -1734,7 +1734,7 @@
             </a:ln>
             <a:extLst>
               <a:ext uri="{91240B29-F687-4f45-9708-019B960494DF}">
-                <a14:hiddenLine xmlns:a14="http://schemas.microsoft.com/office/drawing/2010/main" xmlns="" w="9525">
+                <a14:hiddenLine xmlns="" xmlns:a14="http://schemas.microsoft.com/office/drawing/2010/main" w="9525">
                   <a:solidFill>
                     <a:srgbClr val="000000"/>
                   </a:solidFill>
@@ -1790,7 +1790,7 @@
             </a:ln>
             <a:extLst>
               <a:ext uri="{91240B29-F687-4f45-9708-019B960494DF}">
-                <a14:hiddenLine xmlns:a14="http://schemas.microsoft.com/office/drawing/2010/main" xmlns="" w="9525">
+                <a14:hiddenLine xmlns="" xmlns:a14="http://schemas.microsoft.com/office/drawing/2010/main" w="9525">
                   <a:solidFill>
                     <a:srgbClr val="000000"/>
                   </a:solidFill>
@@ -1880,7 +1880,7 @@
             </a:ln>
             <a:extLst>
               <a:ext uri="{91240B29-F687-4f45-9708-019B960494DF}">
-                <a14:hiddenLine xmlns:a14="http://schemas.microsoft.com/office/drawing/2010/main" xmlns="" w="9525">
+                <a14:hiddenLine xmlns="" xmlns:a14="http://schemas.microsoft.com/office/drawing/2010/main" w="9525">
                   <a:solidFill>
                     <a:srgbClr val="000000"/>
                   </a:solidFill>
@@ -1936,7 +1936,7 @@
             </a:ln>
             <a:extLst>
               <a:ext uri="{91240B29-F687-4f45-9708-019B960494DF}">
-                <a14:hiddenLine xmlns:a14="http://schemas.microsoft.com/office/drawing/2010/main" xmlns="" w="9525">
+                <a14:hiddenLine xmlns="" xmlns:a14="http://schemas.microsoft.com/office/drawing/2010/main" w="9525">
                   <a:solidFill>
                     <a:srgbClr val="000000"/>
                   </a:solidFill>
@@ -2026,7 +2026,7 @@
             </a:ln>
             <a:extLst>
               <a:ext uri="{91240B29-F687-4f45-9708-019B960494DF}">
-                <a14:hiddenLine xmlns:a14="http://schemas.microsoft.com/office/drawing/2010/main" xmlns="" w="9525">
+                <a14:hiddenLine xmlns="" xmlns:a14="http://schemas.microsoft.com/office/drawing/2010/main" w="9525">
                   <a:solidFill>
                     <a:srgbClr val="000000"/>
                   </a:solidFill>
@@ -2094,7 +2094,7 @@
             </a:ln>
             <a:extLst>
               <a:ext uri="{91240B29-F687-4f45-9708-019B960494DF}">
-                <a14:hiddenLine xmlns:a14="http://schemas.microsoft.com/office/drawing/2010/main" xmlns="" w="9525">
+                <a14:hiddenLine xmlns="" xmlns:a14="http://schemas.microsoft.com/office/drawing/2010/main" w="9525">
                   <a:solidFill>
                     <a:srgbClr val="000000"/>
                   </a:solidFill>
@@ -2184,7 +2184,7 @@
             </a:ln>
             <a:extLst>
               <a:ext uri="{91240B29-F687-4f45-9708-019B960494DF}">
-                <a14:hiddenLine xmlns:a14="http://schemas.microsoft.com/office/drawing/2010/main" xmlns="" w="9525">
+                <a14:hiddenLine xmlns="" xmlns:a14="http://schemas.microsoft.com/office/drawing/2010/main" w="9525">
                   <a:solidFill>
                     <a:srgbClr val="000000"/>
                   </a:solidFill>
@@ -2252,7 +2252,7 @@
             </a:ln>
             <a:extLst>
               <a:ext uri="{91240B29-F687-4f45-9708-019B960494DF}">
-                <a14:hiddenLine xmlns:a14="http://schemas.microsoft.com/office/drawing/2010/main" xmlns="" w="9525">
+                <a14:hiddenLine xmlns="" xmlns:a14="http://schemas.microsoft.com/office/drawing/2010/main" w="9525">
                   <a:solidFill>
                     <a:srgbClr val="000000"/>
                   </a:solidFill>
@@ -2342,7 +2342,7 @@
             </a:ln>
             <a:extLst>
               <a:ext uri="{91240B29-F687-4f45-9708-019B960494DF}">
-                <a14:hiddenLine xmlns:a14="http://schemas.microsoft.com/office/drawing/2010/main" xmlns="" w="9525">
+                <a14:hiddenLine xmlns="" xmlns:a14="http://schemas.microsoft.com/office/drawing/2010/main" w="9525">
                   <a:solidFill>
                     <a:srgbClr val="000000"/>
                   </a:solidFill>
@@ -2376,7 +2376,7 @@
             </a:ln>
             <a:extLst>
               <a:ext uri="{91240B29-F687-4f45-9708-019B960494DF}">
-                <a14:hiddenLine xmlns:a14="http://schemas.microsoft.com/office/drawing/2010/main" xmlns="" w="9525">
+                <a14:hiddenLine xmlns="" xmlns:a14="http://schemas.microsoft.com/office/drawing/2010/main" w="9525">
                   <a:solidFill>
                     <a:srgbClr val="000000"/>
                   </a:solidFill>
@@ -2466,7 +2466,7 @@
             </a:ln>
             <a:extLst>
               <a:ext uri="{91240B29-F687-4f45-9708-019B960494DF}">
-                <a14:hiddenLine xmlns:a14="http://schemas.microsoft.com/office/drawing/2010/main" xmlns="" w="9525">
+                <a14:hiddenLine xmlns="" xmlns:a14="http://schemas.microsoft.com/office/drawing/2010/main" w="9525">
                   <a:solidFill>
                     <a:srgbClr val="000000"/>
                   </a:solidFill>
@@ -2528,7 +2528,7 @@
             </a:ln>
             <a:extLst>
               <a:ext uri="{91240B29-F687-4f45-9708-019B960494DF}">
-                <a14:hiddenLine xmlns:a14="http://schemas.microsoft.com/office/drawing/2010/main" xmlns="" w="9525">
+                <a14:hiddenLine xmlns="" xmlns:a14="http://schemas.microsoft.com/office/drawing/2010/main" w="9525">
                   <a:solidFill>
                     <a:srgbClr val="000000"/>
                   </a:solidFill>
@@ -2590,7 +2590,7 @@
             </a:ln>
             <a:extLst>
               <a:ext uri="{91240B29-F687-4f45-9708-019B960494DF}">
-                <a14:hiddenLine xmlns:a14="http://schemas.microsoft.com/office/drawing/2010/main" xmlns="" w="9525">
+                <a14:hiddenLine xmlns="" xmlns:a14="http://schemas.microsoft.com/office/drawing/2010/main" w="9525">
                   <a:solidFill>
                     <a:srgbClr val="000000"/>
                   </a:solidFill>
@@ -2680,7 +2680,7 @@
             </a:ln>
             <a:extLst>
               <a:ext uri="{91240B29-F687-4f45-9708-019B960494DF}">
-                <a14:hiddenLine xmlns:a14="http://schemas.microsoft.com/office/drawing/2010/main" xmlns="" w="9525">
+                <a14:hiddenLine xmlns="" xmlns:a14="http://schemas.microsoft.com/office/drawing/2010/main" w="9525">
                   <a:solidFill>
                     <a:srgbClr val="000000"/>
                   </a:solidFill>
@@ -2748,7 +2748,7 @@
             </a:ln>
             <a:extLst>
               <a:ext uri="{91240B29-F687-4f45-9708-019B960494DF}">
-                <a14:hiddenLine xmlns:a14="http://schemas.microsoft.com/office/drawing/2010/main" xmlns="" w="9525">
+                <a14:hiddenLine xmlns="" xmlns:a14="http://schemas.microsoft.com/office/drawing/2010/main" w="9525">
                   <a:solidFill>
                     <a:srgbClr val="000000"/>
                   </a:solidFill>
@@ -2810,7 +2810,7 @@
             </a:ln>
             <a:extLst>
               <a:ext uri="{91240B29-F687-4f45-9708-019B960494DF}">
-                <a14:hiddenLine xmlns:a14="http://schemas.microsoft.com/office/drawing/2010/main" xmlns="" w="9525">
+                <a14:hiddenLine xmlns="" xmlns:a14="http://schemas.microsoft.com/office/drawing/2010/main" w="9525">
                   <a:solidFill>
                     <a:srgbClr val="000000"/>
                   </a:solidFill>
@@ -2900,7 +2900,7 @@
             </a:ln>
             <a:extLst>
               <a:ext uri="{91240B29-F687-4f45-9708-019B960494DF}">
-                <a14:hiddenLine xmlns:a14="http://schemas.microsoft.com/office/drawing/2010/main" xmlns="" w="9525">
+                <a14:hiddenLine xmlns="" xmlns:a14="http://schemas.microsoft.com/office/drawing/2010/main" w="9525">
                   <a:solidFill>
                     <a:srgbClr val="000000"/>
                   </a:solidFill>
@@ -2962,7 +2962,7 @@
             </a:ln>
             <a:extLst>
               <a:ext uri="{91240B29-F687-4f45-9708-019B960494DF}">
-                <a14:hiddenLine xmlns:a14="http://schemas.microsoft.com/office/drawing/2010/main" xmlns="" w="9525">
+                <a14:hiddenLine xmlns="" xmlns:a14="http://schemas.microsoft.com/office/drawing/2010/main" w="9525">
                   <a:solidFill>
                     <a:srgbClr val="000000"/>
                   </a:solidFill>
@@ -3052,7 +3052,7 @@
             </a:ln>
             <a:extLst>
               <a:ext uri="{91240B29-F687-4f45-9708-019B960494DF}">
-                <a14:hiddenLine xmlns:a14="http://schemas.microsoft.com/office/drawing/2010/main" xmlns="" w="9525">
+                <a14:hiddenLine xmlns="" xmlns:a14="http://schemas.microsoft.com/office/drawing/2010/main" w="9525">
                   <a:solidFill>
                     <a:srgbClr val="000000"/>
                   </a:solidFill>
@@ -3114,7 +3114,7 @@
             </a:ln>
             <a:extLst>
               <a:ext uri="{91240B29-F687-4f45-9708-019B960494DF}">
-                <a14:hiddenLine xmlns:a14="http://schemas.microsoft.com/office/drawing/2010/main" xmlns="" w="9525">
+                <a14:hiddenLine xmlns="" xmlns:a14="http://schemas.microsoft.com/office/drawing/2010/main" w="9525">
                   <a:solidFill>
                     <a:srgbClr val="000000"/>
                   </a:solidFill>
@@ -3204,7 +3204,7 @@
             </a:ln>
             <a:extLst>
               <a:ext uri="{91240B29-F687-4f45-9708-019B960494DF}">
-                <a14:hiddenLine xmlns:a14="http://schemas.microsoft.com/office/drawing/2010/main" xmlns="" w="9525">
+                <a14:hiddenLine xmlns="" xmlns:a14="http://schemas.microsoft.com/office/drawing/2010/main" w="9525">
                   <a:solidFill>
                     <a:srgbClr val="000000"/>
                   </a:solidFill>
@@ -3238,7 +3238,7 @@
             </a:ln>
             <a:extLst>
               <a:ext uri="{91240B29-F687-4f45-9708-019B960494DF}">
-                <a14:hiddenLine xmlns:a14="http://schemas.microsoft.com/office/drawing/2010/main" xmlns="" w="9525">
+                <a14:hiddenLine xmlns="" xmlns:a14="http://schemas.microsoft.com/office/drawing/2010/main" w="9525">
                   <a:solidFill>
                     <a:srgbClr val="000000"/>
                   </a:solidFill>
@@ -3303,7 +3303,7 @@
             </a:ln>
             <a:extLst>
               <a:ext uri="{91240B29-F687-4f45-9708-019B960494DF}">
-                <a14:hiddenLine xmlns:a14="http://schemas.microsoft.com/office/drawing/2010/main" xmlns="" w="9525">
+                <a14:hiddenLine xmlns="" xmlns:a14="http://schemas.microsoft.com/office/drawing/2010/main" w="9525">
                   <a:solidFill>
                     <a:srgbClr val="000000"/>
                   </a:solidFill>
@@ -3393,7 +3393,7 @@
             </a:ln>
             <a:extLst>
               <a:ext uri="{91240B29-F687-4f45-9708-019B960494DF}">
-                <a14:hiddenLine xmlns:a14="http://schemas.microsoft.com/office/drawing/2010/main" xmlns="" w="9525">
+                <a14:hiddenLine xmlns="" xmlns:a14="http://schemas.microsoft.com/office/drawing/2010/main" w="9525">
                   <a:solidFill>
                     <a:srgbClr val="000000"/>
                   </a:solidFill>
@@ -3455,7 +3455,7 @@
             </a:ln>
             <a:extLst>
               <a:ext uri="{91240B29-F687-4f45-9708-019B960494DF}">
-                <a14:hiddenLine xmlns:a14="http://schemas.microsoft.com/office/drawing/2010/main" xmlns="" w="9525">
+                <a14:hiddenLine xmlns="" xmlns:a14="http://schemas.microsoft.com/office/drawing/2010/main" w="9525">
                   <a:solidFill>
                     <a:srgbClr val="000000"/>
                   </a:solidFill>
@@ -3545,7 +3545,7 @@
             </a:ln>
             <a:extLst>
               <a:ext uri="{91240B29-F687-4f45-9708-019B960494DF}">
-                <a14:hiddenLine xmlns:a14="http://schemas.microsoft.com/office/drawing/2010/main" xmlns="" w="9525">
+                <a14:hiddenLine xmlns="" xmlns:a14="http://schemas.microsoft.com/office/drawing/2010/main" w="9525">
                   <a:solidFill>
                     <a:srgbClr val="000000"/>
                   </a:solidFill>
@@ -3635,7 +3635,7 @@
             </a:ln>
             <a:extLst>
               <a:ext uri="{91240B29-F687-4f45-9708-019B960494DF}">
-                <a14:hiddenLine xmlns:a14="http://schemas.microsoft.com/office/drawing/2010/main" xmlns="" w="9525">
+                <a14:hiddenLine xmlns="" xmlns:a14="http://schemas.microsoft.com/office/drawing/2010/main" w="9525">
                   <a:solidFill>
                     <a:srgbClr val="000000"/>
                   </a:solidFill>
@@ -3700,7 +3700,7 @@
             </a:ln>
             <a:extLst>
               <a:ext uri="{91240B29-F687-4f45-9708-019B960494DF}">
-                <a14:hiddenLine xmlns:a14="http://schemas.microsoft.com/office/drawing/2010/main" xmlns="" w="9525">
+                <a14:hiddenLine xmlns="" xmlns:a14="http://schemas.microsoft.com/office/drawing/2010/main" w="9525">
                   <a:solidFill>
                     <a:srgbClr val="000000"/>
                   </a:solidFill>
@@ -3762,7 +3762,7 @@
             </a:ln>
             <a:extLst>
               <a:ext uri="{91240B29-F687-4f45-9708-019B960494DF}">
-                <a14:hiddenLine xmlns:a14="http://schemas.microsoft.com/office/drawing/2010/main" xmlns="" w="9525">
+                <a14:hiddenLine xmlns="" xmlns:a14="http://schemas.microsoft.com/office/drawing/2010/main" w="9525">
                   <a:solidFill>
                     <a:srgbClr val="000000"/>
                   </a:solidFill>
@@ -3852,7 +3852,7 @@
             </a:ln>
             <a:extLst>
               <a:ext uri="{91240B29-F687-4f45-9708-019B960494DF}">
-                <a14:hiddenLine xmlns:a14="http://schemas.microsoft.com/office/drawing/2010/main" xmlns="" w="9525">
+                <a14:hiddenLine xmlns="" xmlns:a14="http://schemas.microsoft.com/office/drawing/2010/main" w="9525">
                   <a:solidFill>
                     <a:srgbClr val="000000"/>
                   </a:solidFill>
@@ -3942,7 +3942,7 @@
             </a:ln>
             <a:extLst>
               <a:ext uri="{91240B29-F687-4f45-9708-019B960494DF}">
-                <a14:hiddenLine xmlns:a14="http://schemas.microsoft.com/office/drawing/2010/main" xmlns="" w="9525">
+                <a14:hiddenLine xmlns="" xmlns:a14="http://schemas.microsoft.com/office/drawing/2010/main" w="9525">
                   <a:solidFill>
                     <a:srgbClr val="000000"/>
                   </a:solidFill>
@@ -4004,7 +4004,7 @@
             </a:ln>
             <a:extLst>
               <a:ext uri="{91240B29-F687-4f45-9708-019B960494DF}">
-                <a14:hiddenLine xmlns:a14="http://schemas.microsoft.com/office/drawing/2010/main" xmlns="" w="9525">
+                <a14:hiddenLine xmlns="" xmlns:a14="http://schemas.microsoft.com/office/drawing/2010/main" w="9525">
                   <a:solidFill>
                     <a:srgbClr val="000000"/>
                   </a:solidFill>
@@ -4124,7 +4124,7 @@
             </a:ln>
             <a:extLst>
               <a:ext uri="{91240B29-F687-4f45-9708-019B960494DF}">
-                <a14:hiddenLine xmlns:a14="http://schemas.microsoft.com/office/drawing/2010/main" xmlns="" w="9525">
+                <a14:hiddenLine xmlns="" xmlns:a14="http://schemas.microsoft.com/office/drawing/2010/main" w="9525">
                   <a:solidFill>
                     <a:srgbClr val="000000"/>
                   </a:solidFill>
@@ -4192,7 +4192,7 @@
             </a:ln>
             <a:extLst>
               <a:ext uri="{91240B29-F687-4f45-9708-019B960494DF}">
-                <a14:hiddenLine xmlns:a14="http://schemas.microsoft.com/office/drawing/2010/main" xmlns="" w="9525">
+                <a14:hiddenLine xmlns="" xmlns:a14="http://schemas.microsoft.com/office/drawing/2010/main" w="9525">
                   <a:solidFill>
                     <a:srgbClr val="000000"/>
                   </a:solidFill>
@@ -4282,7 +4282,7 @@
             </a:ln>
             <a:extLst>
               <a:ext uri="{91240B29-F687-4f45-9708-019B960494DF}">
-                <a14:hiddenLine xmlns:a14="http://schemas.microsoft.com/office/drawing/2010/main" xmlns="" w="9525">
+                <a14:hiddenLine xmlns="" xmlns:a14="http://schemas.microsoft.com/office/drawing/2010/main" w="9525">
                   <a:solidFill>
                     <a:srgbClr val="000000"/>
                   </a:solidFill>
@@ -9011,7 +9011,7 @@
           <a:noFill/>
           <a:extLst>
             <a:ext uri="{909E8E84-426E-40dd-AFC4-6F175D3DCCD1}">
-              <a14:hiddenFill xmlns:a14="http://schemas.microsoft.com/office/drawing/2010/main" xmlns="">
+              <a14:hiddenFill xmlns="" xmlns:a14="http://schemas.microsoft.com/office/drawing/2010/main">
                 <a:solidFill>
                   <a:srgbClr val="FFFFFF"/>
                 </a:solidFill>
@@ -9085,7 +9085,7 @@
               </a:ln>
               <a:extLst>
                 <a:ext uri="{91240B29-F687-4f45-9708-019B960494DF}">
-                  <a14:hiddenLine xmlns:a14="http://schemas.microsoft.com/office/drawing/2010/main" xmlns="" w="9525">
+                  <a14:hiddenLine xmlns="" xmlns:a14="http://schemas.microsoft.com/office/drawing/2010/main" w="9525">
                     <a:solidFill>
                       <a:srgbClr val="000000"/>
                     </a:solidFill>
@@ -9175,7 +9175,7 @@
               </a:ln>
               <a:extLst>
                 <a:ext uri="{91240B29-F687-4f45-9708-019B960494DF}">
-                  <a14:hiddenLine xmlns:a14="http://schemas.microsoft.com/office/drawing/2010/main" xmlns="" w="9525">
+                  <a14:hiddenLine xmlns="" xmlns:a14="http://schemas.microsoft.com/office/drawing/2010/main" w="9525">
                     <a:solidFill>
                       <a:srgbClr val="000000"/>
                     </a:solidFill>
@@ -9265,7 +9265,7 @@
               </a:ln>
               <a:extLst>
                 <a:ext uri="{91240B29-F687-4f45-9708-019B960494DF}">
-                  <a14:hiddenLine xmlns:a14="http://schemas.microsoft.com/office/drawing/2010/main" xmlns="" w="9525">
+                  <a14:hiddenLine xmlns="" xmlns:a14="http://schemas.microsoft.com/office/drawing/2010/main" w="9525">
                     <a:solidFill>
                       <a:srgbClr val="000000"/>
                     </a:solidFill>
@@ -9327,7 +9327,7 @@
               </a:ln>
               <a:extLst>
                 <a:ext uri="{91240B29-F687-4f45-9708-019B960494DF}">
-                  <a14:hiddenLine xmlns:a14="http://schemas.microsoft.com/office/drawing/2010/main" xmlns="" w="9525">
+                  <a14:hiddenLine xmlns="" xmlns:a14="http://schemas.microsoft.com/office/drawing/2010/main" w="9525">
                     <a:solidFill>
                       <a:srgbClr val="000000"/>
                     </a:solidFill>
@@ -9417,7 +9417,7 @@
               </a:ln>
               <a:extLst>
                 <a:ext uri="{91240B29-F687-4f45-9708-019B960494DF}">
-                  <a14:hiddenLine xmlns:a14="http://schemas.microsoft.com/office/drawing/2010/main" xmlns="" w="9525">
+                  <a14:hiddenLine xmlns="" xmlns:a14="http://schemas.microsoft.com/office/drawing/2010/main" w="9525">
                     <a:solidFill>
                       <a:srgbClr val="000000"/>
                     </a:solidFill>
@@ -9479,7 +9479,7 @@
               </a:ln>
               <a:extLst>
                 <a:ext uri="{91240B29-F687-4f45-9708-019B960494DF}">
-                  <a14:hiddenLine xmlns:a14="http://schemas.microsoft.com/office/drawing/2010/main" xmlns="" w="9525">
+                  <a14:hiddenLine xmlns="" xmlns:a14="http://schemas.microsoft.com/office/drawing/2010/main" w="9525">
                     <a:solidFill>
                       <a:srgbClr val="000000"/>
                     </a:solidFill>
@@ -9541,7 +9541,7 @@
               </a:ln>
               <a:extLst>
                 <a:ext uri="{91240B29-F687-4f45-9708-019B960494DF}">
-                  <a14:hiddenLine xmlns:a14="http://schemas.microsoft.com/office/drawing/2010/main" xmlns="" w="9525">
+                  <a14:hiddenLine xmlns="" xmlns:a14="http://schemas.microsoft.com/office/drawing/2010/main" w="9525">
                     <a:solidFill>
                       <a:srgbClr val="000000"/>
                     </a:solidFill>
@@ -9631,7 +9631,7 @@
               </a:ln>
               <a:extLst>
                 <a:ext uri="{91240B29-F687-4f45-9708-019B960494DF}">
-                  <a14:hiddenLine xmlns:a14="http://schemas.microsoft.com/office/drawing/2010/main" xmlns="" w="9525">
+                  <a14:hiddenLine xmlns="" xmlns:a14="http://schemas.microsoft.com/office/drawing/2010/main" w="9525">
                     <a:solidFill>
                       <a:srgbClr val="000000"/>
                     </a:solidFill>
@@ -9721,7 +9721,7 @@
               </a:ln>
               <a:extLst>
                 <a:ext uri="{91240B29-F687-4f45-9708-019B960494DF}">
-                  <a14:hiddenLine xmlns:a14="http://schemas.microsoft.com/office/drawing/2010/main" xmlns="" w="9525">
+                  <a14:hiddenLine xmlns="" xmlns:a14="http://schemas.microsoft.com/office/drawing/2010/main" w="9525">
                     <a:solidFill>
                       <a:srgbClr val="000000"/>
                     </a:solidFill>
@@ -9783,7 +9783,7 @@
               </a:ln>
               <a:extLst>
                 <a:ext uri="{91240B29-F687-4f45-9708-019B960494DF}">
-                  <a14:hiddenLine xmlns:a14="http://schemas.microsoft.com/office/drawing/2010/main" xmlns="" w="9525">
+                  <a14:hiddenLine xmlns="" xmlns:a14="http://schemas.microsoft.com/office/drawing/2010/main" w="9525">
                     <a:solidFill>
                       <a:srgbClr val="000000"/>
                     </a:solidFill>
@@ -9893,7 +9893,7 @@
               </a:ln>
               <a:extLst>
                 <a:ext uri="{91240B29-F687-4f45-9708-019B960494DF}">
-                  <a14:hiddenLine xmlns:a14="http://schemas.microsoft.com/office/drawing/2010/main" xmlns="" w="9525">
+                  <a14:hiddenLine xmlns="" xmlns:a14="http://schemas.microsoft.com/office/drawing/2010/main" w="9525">
                     <a:solidFill>
                       <a:srgbClr val="000000"/>
                     </a:solidFill>
@@ -9977,7 +9977,7 @@
               </a:ln>
               <a:extLst>
                 <a:ext uri="{91240B29-F687-4f45-9708-019B960494DF}">
-                  <a14:hiddenLine xmlns:a14="http://schemas.microsoft.com/office/drawing/2010/main" xmlns="" w="9525">
+                  <a14:hiddenLine xmlns="" xmlns:a14="http://schemas.microsoft.com/office/drawing/2010/main" w="9525">
                     <a:solidFill>
                       <a:srgbClr val="000000"/>
                     </a:solidFill>
@@ -10039,7 +10039,7 @@
               </a:ln>
               <a:extLst>
                 <a:ext uri="{91240B29-F687-4f45-9708-019B960494DF}">
-                  <a14:hiddenLine xmlns:a14="http://schemas.microsoft.com/office/drawing/2010/main" xmlns="" w="9525">
+                  <a14:hiddenLine xmlns="" xmlns:a14="http://schemas.microsoft.com/office/drawing/2010/main" w="9525">
                     <a:solidFill>
                       <a:srgbClr val="000000"/>
                     </a:solidFill>
@@ -10101,7 +10101,7 @@
               </a:ln>
               <a:extLst>
                 <a:ext uri="{91240B29-F687-4f45-9708-019B960494DF}">
-                  <a14:hiddenLine xmlns:a14="http://schemas.microsoft.com/office/drawing/2010/main" xmlns="" w="9525">
+                  <a14:hiddenLine xmlns="" xmlns:a14="http://schemas.microsoft.com/office/drawing/2010/main" w="9525">
                     <a:solidFill>
                       <a:srgbClr val="000000"/>
                     </a:solidFill>
@@ -10191,7 +10191,7 @@
               </a:ln>
               <a:extLst>
                 <a:ext uri="{91240B29-F687-4f45-9708-019B960494DF}">
-                  <a14:hiddenLine xmlns:a14="http://schemas.microsoft.com/office/drawing/2010/main" xmlns="" w="9525">
+                  <a14:hiddenLine xmlns="" xmlns:a14="http://schemas.microsoft.com/office/drawing/2010/main" w="9525">
                     <a:solidFill>
                       <a:srgbClr val="000000"/>
                     </a:solidFill>
@@ -10225,7 +10225,7 @@
               </a:ln>
               <a:extLst>
                 <a:ext uri="{91240B29-F687-4f45-9708-019B960494DF}">
-                  <a14:hiddenLine xmlns:a14="http://schemas.microsoft.com/office/drawing/2010/main" xmlns="" w="9525">
+                  <a14:hiddenLine xmlns="" xmlns:a14="http://schemas.microsoft.com/office/drawing/2010/main" w="9525">
                     <a:solidFill>
                       <a:srgbClr val="000000"/>
                     </a:solidFill>
@@ -10290,7 +10290,7 @@
               </a:ln>
               <a:extLst>
                 <a:ext uri="{91240B29-F687-4f45-9708-019B960494DF}">
-                  <a14:hiddenLine xmlns:a14="http://schemas.microsoft.com/office/drawing/2010/main" xmlns="" w="9525">
+                  <a14:hiddenLine xmlns="" xmlns:a14="http://schemas.microsoft.com/office/drawing/2010/main" w="9525">
                     <a:solidFill>
                       <a:srgbClr val="000000"/>
                     </a:solidFill>
@@ -10380,7 +10380,7 @@
               </a:ln>
               <a:extLst>
                 <a:ext uri="{91240B29-F687-4f45-9708-019B960494DF}">
-                  <a14:hiddenLine xmlns:a14="http://schemas.microsoft.com/office/drawing/2010/main" xmlns="" w="9525">
+                  <a14:hiddenLine xmlns="" xmlns:a14="http://schemas.microsoft.com/office/drawing/2010/main" w="9525">
                     <a:solidFill>
                       <a:srgbClr val="000000"/>
                     </a:solidFill>
@@ -10442,7 +10442,7 @@
               </a:ln>
               <a:extLst>
                 <a:ext uri="{91240B29-F687-4f45-9708-019B960494DF}">
-                  <a14:hiddenLine xmlns:a14="http://schemas.microsoft.com/office/drawing/2010/main" xmlns="" w="9525">
+                  <a14:hiddenLine xmlns="" xmlns:a14="http://schemas.microsoft.com/office/drawing/2010/main" w="9525">
                     <a:solidFill>
                       <a:srgbClr val="000000"/>
                     </a:solidFill>
@@ -10532,7 +10532,7 @@
               </a:ln>
               <a:extLst>
                 <a:ext uri="{91240B29-F687-4f45-9708-019B960494DF}">
-                  <a14:hiddenLine xmlns:a14="http://schemas.microsoft.com/office/drawing/2010/main" xmlns="" w="9525">
+                  <a14:hiddenLine xmlns="" xmlns:a14="http://schemas.microsoft.com/office/drawing/2010/main" w="9525">
                     <a:solidFill>
                       <a:srgbClr val="000000"/>
                     </a:solidFill>
@@ -10597,7 +10597,7 @@
               </a:ln>
               <a:extLst>
                 <a:ext uri="{91240B29-F687-4f45-9708-019B960494DF}">
-                  <a14:hiddenLine xmlns:a14="http://schemas.microsoft.com/office/drawing/2010/main" xmlns="" w="9525">
+                  <a14:hiddenLine xmlns="" xmlns:a14="http://schemas.microsoft.com/office/drawing/2010/main" w="9525">
                     <a:solidFill>
                       <a:srgbClr val="000000"/>
                     </a:solidFill>
@@ -10659,7 +10659,7 @@
               </a:ln>
               <a:extLst>
                 <a:ext uri="{91240B29-F687-4f45-9708-019B960494DF}">
-                  <a14:hiddenLine xmlns:a14="http://schemas.microsoft.com/office/drawing/2010/main" xmlns="" w="9525">
+                  <a14:hiddenLine xmlns="" xmlns:a14="http://schemas.microsoft.com/office/drawing/2010/main" w="9525">
                     <a:solidFill>
                       <a:srgbClr val="000000"/>
                     </a:solidFill>
@@ -10749,7 +10749,7 @@
               </a:ln>
               <a:extLst>
                 <a:ext uri="{91240B29-F687-4f45-9708-019B960494DF}">
-                  <a14:hiddenLine xmlns:a14="http://schemas.microsoft.com/office/drawing/2010/main" xmlns="" w="9525">
+                  <a14:hiddenLine xmlns="" xmlns:a14="http://schemas.microsoft.com/office/drawing/2010/main" w="9525">
                     <a:solidFill>
                       <a:srgbClr val="000000"/>
                     </a:solidFill>
@@ -10839,7 +10839,7 @@
               </a:ln>
               <a:extLst>
                 <a:ext uri="{91240B29-F687-4f45-9708-019B960494DF}">
-                  <a14:hiddenLine xmlns:a14="http://schemas.microsoft.com/office/drawing/2010/main" xmlns="" w="9525">
+                  <a14:hiddenLine xmlns="" xmlns:a14="http://schemas.microsoft.com/office/drawing/2010/main" w="9525">
                     <a:solidFill>
                       <a:srgbClr val="000000"/>
                     </a:solidFill>
@@ -10904,7 +10904,7 @@
               </a:ln>
               <a:extLst>
                 <a:ext uri="{91240B29-F687-4f45-9708-019B960494DF}">
-                  <a14:hiddenLine xmlns:a14="http://schemas.microsoft.com/office/drawing/2010/main" xmlns="" w="9525">
+                  <a14:hiddenLine xmlns="" xmlns:a14="http://schemas.microsoft.com/office/drawing/2010/main" w="9525">
                     <a:solidFill>
                       <a:srgbClr val="000000"/>
                     </a:solidFill>
@@ -11024,7 +11024,7 @@
               </a:ln>
               <a:extLst>
                 <a:ext uri="{91240B29-F687-4f45-9708-019B960494DF}">
-                  <a14:hiddenLine xmlns:a14="http://schemas.microsoft.com/office/drawing/2010/main" xmlns="" w="9525">
+                  <a14:hiddenLine xmlns="" xmlns:a14="http://schemas.microsoft.com/office/drawing/2010/main" w="9525">
                     <a:solidFill>
                       <a:srgbClr val="000000"/>
                     </a:solidFill>
@@ -11122,7 +11122,7 @@
               </a:ln>
               <a:extLst>
                 <a:ext uri="{91240B29-F687-4f45-9708-019B960494DF}">
-                  <a14:hiddenLine xmlns:a14="http://schemas.microsoft.com/office/drawing/2010/main" xmlns="" w="9525">
+                  <a14:hiddenLine xmlns="" xmlns:a14="http://schemas.microsoft.com/office/drawing/2010/main" w="9525">
                     <a:solidFill>
                       <a:srgbClr val="000000"/>
                     </a:solidFill>
@@ -11237,7 +11237,7 @@
               </a:ln>
               <a:extLst>
                 <a:ext uri="{91240B29-F687-4f45-9708-019B960494DF}">
-                  <a14:hiddenLine xmlns:a14="http://schemas.microsoft.com/office/drawing/2010/main" xmlns="" w="9525">
+                  <a14:hiddenLine xmlns="" xmlns:a14="http://schemas.microsoft.com/office/drawing/2010/main" w="9525">
                     <a:solidFill>
                       <a:srgbClr val="000000"/>
                     </a:solidFill>
@@ -11327,7 +11327,7 @@
               </a:ln>
               <a:extLst>
                 <a:ext uri="{91240B29-F687-4f45-9708-019B960494DF}">
-                  <a14:hiddenLine xmlns:a14="http://schemas.microsoft.com/office/drawing/2010/main" xmlns="" w="9525">
+                  <a14:hiddenLine xmlns="" xmlns:a14="http://schemas.microsoft.com/office/drawing/2010/main" w="9525">
                     <a:solidFill>
                       <a:srgbClr val="000000"/>
                     </a:solidFill>
@@ -11392,7 +11392,7 @@
               </a:ln>
               <a:extLst>
                 <a:ext uri="{91240B29-F687-4f45-9708-019B960494DF}">
-                  <a14:hiddenLine xmlns:a14="http://schemas.microsoft.com/office/drawing/2010/main" xmlns="" w="9525">
+                  <a14:hiddenLine xmlns="" xmlns:a14="http://schemas.microsoft.com/office/drawing/2010/main" w="9525">
                     <a:solidFill>
                       <a:srgbClr val="000000"/>
                     </a:solidFill>
@@ -11482,7 +11482,7 @@
               </a:ln>
               <a:extLst>
                 <a:ext uri="{91240B29-F687-4f45-9708-019B960494DF}">
-                  <a14:hiddenLine xmlns:a14="http://schemas.microsoft.com/office/drawing/2010/main" xmlns="" w="9525">
+                  <a14:hiddenLine xmlns="" xmlns:a14="http://schemas.microsoft.com/office/drawing/2010/main" w="9525">
                     <a:solidFill>
                       <a:srgbClr val="000000"/>
                     </a:solidFill>
@@ -11550,7 +11550,7 @@
               </a:ln>
               <a:extLst>
                 <a:ext uri="{91240B29-F687-4f45-9708-019B960494DF}">
-                  <a14:hiddenLine xmlns:a14="http://schemas.microsoft.com/office/drawing/2010/main" xmlns="" w="9525">
+                  <a14:hiddenLine xmlns="" xmlns:a14="http://schemas.microsoft.com/office/drawing/2010/main" w="9525">
                     <a:solidFill>
                       <a:srgbClr val="000000"/>
                     </a:solidFill>
@@ -11640,7 +11640,7 @@
               </a:ln>
               <a:extLst>
                 <a:ext uri="{91240B29-F687-4f45-9708-019B960494DF}">
-                  <a14:hiddenLine xmlns:a14="http://schemas.microsoft.com/office/drawing/2010/main" xmlns="" w="9525">
+                  <a14:hiddenLine xmlns="" xmlns:a14="http://schemas.microsoft.com/office/drawing/2010/main" w="9525">
                     <a:solidFill>
                       <a:srgbClr val="000000"/>
                     </a:solidFill>
@@ -11708,7 +11708,7 @@
               </a:ln>
               <a:extLst>
                 <a:ext uri="{91240B29-F687-4f45-9708-019B960494DF}">
-                  <a14:hiddenLine xmlns:a14="http://schemas.microsoft.com/office/drawing/2010/main" xmlns="" w="9525">
+                  <a14:hiddenLine xmlns="" xmlns:a14="http://schemas.microsoft.com/office/drawing/2010/main" w="9525">
                     <a:solidFill>
                       <a:srgbClr val="000000"/>
                     </a:solidFill>
@@ -11798,7 +11798,7 @@
               </a:ln>
               <a:extLst>
                 <a:ext uri="{91240B29-F687-4f45-9708-019B960494DF}">
-                  <a14:hiddenLine xmlns:a14="http://schemas.microsoft.com/office/drawing/2010/main" xmlns="" w="9525">
+                  <a14:hiddenLine xmlns="" xmlns:a14="http://schemas.microsoft.com/office/drawing/2010/main" w="9525">
                     <a:solidFill>
                       <a:srgbClr val="000000"/>
                     </a:solidFill>
@@ -11832,7 +11832,7 @@
               </a:ln>
               <a:extLst>
                 <a:ext uri="{91240B29-F687-4f45-9708-019B960494DF}">
-                  <a14:hiddenLine xmlns:a14="http://schemas.microsoft.com/office/drawing/2010/main" xmlns="" w="9525">
+                  <a14:hiddenLine xmlns="" xmlns:a14="http://schemas.microsoft.com/office/drawing/2010/main" w="9525">
                     <a:solidFill>
                       <a:srgbClr val="000000"/>
                     </a:solidFill>
@@ -13149,7 +13149,7 @@
             </a:pPr>
             <a:r>
               <a:rPr lang="fr-FR" dirty="0"/>
-              <a:t>BDD et Dev back : Alexandre BACA</a:t>
+              <a:t>BDD , Dev back, Gestion de projet : Alexandre BACA</a:t>
             </a:r>
           </a:p>
           <a:p>
@@ -13200,7 +13200,7 @@
             </a:pPr>
             <a:r>
               <a:rPr lang="fr-FR" dirty="0"/>
-              <a:t>Formulaires : Christophe COUERBE</a:t>
+              <a:t>Dev front : Christophe COUERBE</a:t>
             </a:r>
           </a:p>
           <a:p>
@@ -13217,7 +13217,7 @@
             </a:pPr>
             <a:r>
               <a:rPr lang="fr-FR" dirty="0"/>
-              <a:t>Maquettes et des livrables : Nicolas KAMPHAUS</a:t>
+              <a:t>Maquettes, des livrables et Gestion de projet : Nicolas KAMPHAUS</a:t>
             </a:r>
           </a:p>
           <a:p>
@@ -13249,8 +13249,38 @@
         </p:blipFill>
         <p:spPr>
           <a:xfrm>
-            <a:off x="7533314" y="5162188"/>
+            <a:off x="9085277" y="5071465"/>
             <a:ext cx="1340187" cy="1491313"/>
+          </a:xfrm>
+          <a:prstGeom prst="rect">
+            <a:avLst/>
+          </a:prstGeom>
+        </p:spPr>
+      </p:pic>
+      <p:pic>
+        <p:nvPicPr>
+          <p:cNvPr id="6" name="Image 5">
+            <a:extLst>
+              <a:ext uri="{FF2B5EF4-FFF2-40B4-BE49-F238E27FC236}">
+                <a16:creationId xmlns:a16="http://schemas.microsoft.com/office/drawing/2014/main" id="{AE3C90A0-7F3A-4EBB-9327-01652850617F}"/>
+              </a:ext>
+            </a:extLst>
+          </p:cNvPr>
+          <p:cNvPicPr>
+            <a:picLocks noChangeAspect="1"/>
+          </p:cNvPicPr>
+          <p:nvPr/>
+        </p:nvPicPr>
+        <p:blipFill>
+          <a:blip r:embed="rId3"/>
+          <a:stretch>
+            <a:fillRect/>
+          </a:stretch>
+        </p:blipFill>
+        <p:spPr>
+          <a:xfrm>
+            <a:off x="9085277" y="1693225"/>
+            <a:ext cx="1491313" cy="1491313"/>
           </a:xfrm>
           <a:prstGeom prst="rect">
             <a:avLst/>
@@ -13774,6 +13804,36 @@
           <a:xfrm rot="533324">
             <a:off x="9202722" y="874085"/>
             <a:ext cx="1491577" cy="1103767"/>
+          </a:xfrm>
+          <a:prstGeom prst="rect">
+            <a:avLst/>
+          </a:prstGeom>
+        </p:spPr>
+      </p:pic>
+      <p:pic>
+        <p:nvPicPr>
+          <p:cNvPr id="8" name="Image 7">
+            <a:extLst>
+              <a:ext uri="{FF2B5EF4-FFF2-40B4-BE49-F238E27FC236}">
+                <a16:creationId xmlns:a16="http://schemas.microsoft.com/office/drawing/2014/main" id="{DF558FD0-9C47-4DDC-907C-ADC95B510DA7}"/>
+              </a:ext>
+            </a:extLst>
+          </p:cNvPr>
+          <p:cNvPicPr>
+            <a:picLocks noChangeAspect="1"/>
+          </p:cNvPicPr>
+          <p:nvPr/>
+        </p:nvPicPr>
+        <p:blipFill>
+          <a:blip r:embed="rId3"/>
+          <a:stretch>
+            <a:fillRect/>
+          </a:stretch>
+        </p:blipFill>
+        <p:spPr>
+          <a:xfrm>
+            <a:off x="8748712" y="4595812"/>
+            <a:ext cx="2543175" cy="1800225"/>
           </a:xfrm>
           <a:prstGeom prst="rect">
             <a:avLst/>

</xml_diff>

<commit_message>
ajout nom libreri pour faire de l'excel
</commit_message>
<xml_diff>
--- a/Le_Bon_Potager.pptx
+++ b/Le_Bon_Potager.pptx
@@ -224,7 +224,7 @@
           <a:p>
             <a:fld id="{B37074D2-1154-4E21-849D-9DCC1A8677AB}" type="datetimeFigureOut">
               <a:rPr lang="fr-FR" smtClean="0"/>
-              <a:t>14/04/2018</a:t>
+              <a:t>15/04/2018</a:t>
             </a:fld>
             <a:endParaRPr lang="fr-FR"/>
           </a:p>
@@ -548,7 +548,7 @@
           <a:noFill/>
           <a:extLst>
             <a:ext uri="{909E8E84-426E-40dd-AFC4-6F175D3DCCD1}">
-              <a14:hiddenFill xmlns:a14="http://schemas.microsoft.com/office/drawing/2010/main" xmlns="">
+              <a14:hiddenFill xmlns="" xmlns:a14="http://schemas.microsoft.com/office/drawing/2010/main">
                 <a:solidFill>
                   <a:srgbClr val="FFFFFF"/>
                 </a:solidFill>
@@ -608,7 +608,7 @@
             </a:ln>
             <a:extLst>
               <a:ext uri="{91240B29-F687-4f45-9708-019B960494DF}">
-                <a14:hiddenLine xmlns:a14="http://schemas.microsoft.com/office/drawing/2010/main" xmlns="" w="9525">
+                <a14:hiddenLine xmlns="" xmlns:a14="http://schemas.microsoft.com/office/drawing/2010/main" w="9525">
                   <a:solidFill>
                     <a:srgbClr val="000000"/>
                   </a:solidFill>
@@ -698,7 +698,7 @@
             </a:ln>
             <a:extLst>
               <a:ext uri="{91240B29-F687-4f45-9708-019B960494DF}">
-                <a14:hiddenLine xmlns:a14="http://schemas.microsoft.com/office/drawing/2010/main" xmlns="" w="9525">
+                <a14:hiddenLine xmlns="" xmlns:a14="http://schemas.microsoft.com/office/drawing/2010/main" w="9525">
                   <a:solidFill>
                     <a:srgbClr val="000000"/>
                   </a:solidFill>
@@ -788,7 +788,7 @@
             </a:ln>
             <a:extLst>
               <a:ext uri="{91240B29-F687-4f45-9708-019B960494DF}">
-                <a14:hiddenLine xmlns:a14="http://schemas.microsoft.com/office/drawing/2010/main" xmlns="" w="9525">
+                <a14:hiddenLine xmlns="" xmlns:a14="http://schemas.microsoft.com/office/drawing/2010/main" w="9525">
                   <a:solidFill>
                     <a:srgbClr val="000000"/>
                   </a:solidFill>
@@ -822,7 +822,7 @@
             </a:ln>
             <a:extLst>
               <a:ext uri="{91240B29-F687-4f45-9708-019B960494DF}">
-                <a14:hiddenLine xmlns:a14="http://schemas.microsoft.com/office/drawing/2010/main" xmlns="" w="9525">
+                <a14:hiddenLine xmlns="" xmlns:a14="http://schemas.microsoft.com/office/drawing/2010/main" w="9525">
                   <a:solidFill>
                     <a:srgbClr val="000000"/>
                   </a:solidFill>
@@ -912,7 +912,7 @@
             </a:ln>
             <a:extLst>
               <a:ext uri="{91240B29-F687-4f45-9708-019B960494DF}">
-                <a14:hiddenLine xmlns:a14="http://schemas.microsoft.com/office/drawing/2010/main" xmlns="" w="9525">
+                <a14:hiddenLine xmlns="" xmlns:a14="http://schemas.microsoft.com/office/drawing/2010/main" w="9525">
                   <a:solidFill>
                     <a:srgbClr val="000000"/>
                   </a:solidFill>
@@ -974,7 +974,7 @@
             </a:ln>
             <a:extLst>
               <a:ext uri="{91240B29-F687-4f45-9708-019B960494DF}">
-                <a14:hiddenLine xmlns:a14="http://schemas.microsoft.com/office/drawing/2010/main" xmlns="" w="9525">
+                <a14:hiddenLine xmlns="" xmlns:a14="http://schemas.microsoft.com/office/drawing/2010/main" w="9525">
                   <a:solidFill>
                     <a:srgbClr val="000000"/>
                   </a:solidFill>
@@ -1036,7 +1036,7 @@
             </a:ln>
             <a:extLst>
               <a:ext uri="{91240B29-F687-4f45-9708-019B960494DF}">
-                <a14:hiddenLine xmlns:a14="http://schemas.microsoft.com/office/drawing/2010/main" xmlns="" w="9525">
+                <a14:hiddenLine xmlns="" xmlns:a14="http://schemas.microsoft.com/office/drawing/2010/main" w="9525">
                   <a:solidFill>
                     <a:srgbClr val="000000"/>
                   </a:solidFill>
@@ -1126,7 +1126,7 @@
             </a:ln>
             <a:extLst>
               <a:ext uri="{91240B29-F687-4f45-9708-019B960494DF}">
-                <a14:hiddenLine xmlns:a14="http://schemas.microsoft.com/office/drawing/2010/main" xmlns="" w="9525">
+                <a14:hiddenLine xmlns="" xmlns:a14="http://schemas.microsoft.com/office/drawing/2010/main" w="9525">
                   <a:solidFill>
                     <a:srgbClr val="000000"/>
                   </a:solidFill>
@@ -1188,7 +1188,7 @@
             </a:ln>
             <a:extLst>
               <a:ext uri="{91240B29-F687-4f45-9708-019B960494DF}">
-                <a14:hiddenLine xmlns:a14="http://schemas.microsoft.com/office/drawing/2010/main" xmlns="" w="9525">
+                <a14:hiddenLine xmlns="" xmlns:a14="http://schemas.microsoft.com/office/drawing/2010/main" w="9525">
                   <a:solidFill>
                     <a:srgbClr val="000000"/>
                   </a:solidFill>
@@ -1250,7 +1250,7 @@
             </a:ln>
             <a:extLst>
               <a:ext uri="{91240B29-F687-4f45-9708-019B960494DF}">
-                <a14:hiddenLine xmlns:a14="http://schemas.microsoft.com/office/drawing/2010/main" xmlns="" w="9525">
+                <a14:hiddenLine xmlns="" xmlns:a14="http://schemas.microsoft.com/office/drawing/2010/main" w="9525">
                   <a:solidFill>
                     <a:srgbClr val="000000"/>
                   </a:solidFill>
@@ -1340,7 +1340,7 @@
             </a:ln>
             <a:extLst>
               <a:ext uri="{91240B29-F687-4f45-9708-019B960494DF}">
-                <a14:hiddenLine xmlns:a14="http://schemas.microsoft.com/office/drawing/2010/main" xmlns="" w="9525">
+                <a14:hiddenLine xmlns="" xmlns:a14="http://schemas.microsoft.com/office/drawing/2010/main" w="9525">
                   <a:solidFill>
                     <a:srgbClr val="000000"/>
                   </a:solidFill>
@@ -1430,7 +1430,7 @@
             </a:ln>
             <a:extLst>
               <a:ext uri="{91240B29-F687-4f45-9708-019B960494DF}">
-                <a14:hiddenLine xmlns:a14="http://schemas.microsoft.com/office/drawing/2010/main" xmlns="" w="9525">
+                <a14:hiddenLine xmlns="" xmlns:a14="http://schemas.microsoft.com/office/drawing/2010/main" w="9525">
                   <a:solidFill>
                     <a:srgbClr val="000000"/>
                   </a:solidFill>
@@ -1492,7 +1492,7 @@
             </a:ln>
             <a:extLst>
               <a:ext uri="{91240B29-F687-4f45-9708-019B960494DF}">
-                <a14:hiddenLine xmlns:a14="http://schemas.microsoft.com/office/drawing/2010/main" xmlns="" w="9525">
+                <a14:hiddenLine xmlns="" xmlns:a14="http://schemas.microsoft.com/office/drawing/2010/main" w="9525">
                   <a:solidFill>
                     <a:srgbClr val="000000"/>
                   </a:solidFill>
@@ -1602,7 +1602,7 @@
             </a:ln>
             <a:extLst>
               <a:ext uri="{91240B29-F687-4f45-9708-019B960494DF}">
-                <a14:hiddenLine xmlns:a14="http://schemas.microsoft.com/office/drawing/2010/main" xmlns="" w="9525">
+                <a14:hiddenLine xmlns="" xmlns:a14="http://schemas.microsoft.com/office/drawing/2010/main" w="9525">
                   <a:solidFill>
                     <a:srgbClr val="000000"/>
                   </a:solidFill>
@@ -1664,7 +1664,7 @@
             </a:ln>
             <a:extLst>
               <a:ext uri="{91240B29-F687-4f45-9708-019B960494DF}">
-                <a14:hiddenLine xmlns:a14="http://schemas.microsoft.com/office/drawing/2010/main" xmlns="" w="9525">
+                <a14:hiddenLine xmlns="" xmlns:a14="http://schemas.microsoft.com/office/drawing/2010/main" w="9525">
                   <a:solidFill>
                     <a:srgbClr val="000000"/>
                   </a:solidFill>
@@ -1754,7 +1754,7 @@
             </a:ln>
             <a:extLst>
               <a:ext uri="{91240B29-F687-4f45-9708-019B960494DF}">
-                <a14:hiddenLine xmlns:a14="http://schemas.microsoft.com/office/drawing/2010/main" xmlns="" w="9525">
+                <a14:hiddenLine xmlns="" xmlns:a14="http://schemas.microsoft.com/office/drawing/2010/main" w="9525">
                   <a:solidFill>
                     <a:srgbClr val="000000"/>
                   </a:solidFill>
@@ -1844,7 +1844,7 @@
             </a:ln>
             <a:extLst>
               <a:ext uri="{91240B29-F687-4f45-9708-019B960494DF}">
-                <a14:hiddenLine xmlns:a14="http://schemas.microsoft.com/office/drawing/2010/main" xmlns="" w="9525">
+                <a14:hiddenLine xmlns="" xmlns:a14="http://schemas.microsoft.com/office/drawing/2010/main" w="9525">
                   <a:solidFill>
                     <a:srgbClr val="000000"/>
                   </a:solidFill>
@@ -1906,7 +1906,7 @@
             </a:ln>
             <a:extLst>
               <a:ext uri="{91240B29-F687-4f45-9708-019B960494DF}">
-                <a14:hiddenLine xmlns:a14="http://schemas.microsoft.com/office/drawing/2010/main" xmlns="" w="9525">
+                <a14:hiddenLine xmlns="" xmlns:a14="http://schemas.microsoft.com/office/drawing/2010/main" w="9525">
                   <a:solidFill>
                     <a:srgbClr val="000000"/>
                   </a:solidFill>
@@ -1996,7 +1996,7 @@
             </a:ln>
             <a:extLst>
               <a:ext uri="{91240B29-F687-4f45-9708-019B960494DF}">
-                <a14:hiddenLine xmlns:a14="http://schemas.microsoft.com/office/drawing/2010/main" xmlns="" w="9525">
+                <a14:hiddenLine xmlns="" xmlns:a14="http://schemas.microsoft.com/office/drawing/2010/main" w="9525">
                   <a:solidFill>
                     <a:srgbClr val="000000"/>
                   </a:solidFill>
@@ -2086,7 +2086,7 @@
             </a:ln>
             <a:extLst>
               <a:ext uri="{91240B29-F687-4f45-9708-019B960494DF}">
-                <a14:hiddenLine xmlns:a14="http://schemas.microsoft.com/office/drawing/2010/main" xmlns="" w="9525">
+                <a14:hiddenLine xmlns="" xmlns:a14="http://schemas.microsoft.com/office/drawing/2010/main" w="9525">
                   <a:solidFill>
                     <a:srgbClr val="000000"/>
                   </a:solidFill>
@@ -2142,7 +2142,7 @@
             </a:ln>
             <a:extLst>
               <a:ext uri="{91240B29-F687-4f45-9708-019B960494DF}">
-                <a14:hiddenLine xmlns:a14="http://schemas.microsoft.com/office/drawing/2010/main" xmlns="" w="9525">
+                <a14:hiddenLine xmlns="" xmlns:a14="http://schemas.microsoft.com/office/drawing/2010/main" w="9525">
                   <a:solidFill>
                     <a:srgbClr val="000000"/>
                   </a:solidFill>
@@ -2232,7 +2232,7 @@
             </a:ln>
             <a:extLst>
               <a:ext uri="{91240B29-F687-4f45-9708-019B960494DF}">
-                <a14:hiddenLine xmlns:a14="http://schemas.microsoft.com/office/drawing/2010/main" xmlns="" w="9525">
+                <a14:hiddenLine xmlns="" xmlns:a14="http://schemas.microsoft.com/office/drawing/2010/main" w="9525">
                   <a:solidFill>
                     <a:srgbClr val="000000"/>
                   </a:solidFill>
@@ -2288,7 +2288,7 @@
             </a:ln>
             <a:extLst>
               <a:ext uri="{91240B29-F687-4f45-9708-019B960494DF}">
-                <a14:hiddenLine xmlns:a14="http://schemas.microsoft.com/office/drawing/2010/main" xmlns="" w="9525">
+                <a14:hiddenLine xmlns="" xmlns:a14="http://schemas.microsoft.com/office/drawing/2010/main" w="9525">
                   <a:solidFill>
                     <a:srgbClr val="000000"/>
                   </a:solidFill>
@@ -2378,7 +2378,7 @@
             </a:ln>
             <a:extLst>
               <a:ext uri="{91240B29-F687-4f45-9708-019B960494DF}">
-                <a14:hiddenLine xmlns:a14="http://schemas.microsoft.com/office/drawing/2010/main" xmlns="" w="9525">
+                <a14:hiddenLine xmlns="" xmlns:a14="http://schemas.microsoft.com/office/drawing/2010/main" w="9525">
                   <a:solidFill>
                     <a:srgbClr val="000000"/>
                   </a:solidFill>
@@ -2446,7 +2446,7 @@
             </a:ln>
             <a:extLst>
               <a:ext uri="{91240B29-F687-4f45-9708-019B960494DF}">
-                <a14:hiddenLine xmlns:a14="http://schemas.microsoft.com/office/drawing/2010/main" xmlns="" w="9525">
+                <a14:hiddenLine xmlns="" xmlns:a14="http://schemas.microsoft.com/office/drawing/2010/main" w="9525">
                   <a:solidFill>
                     <a:srgbClr val="000000"/>
                   </a:solidFill>
@@ -2536,7 +2536,7 @@
             </a:ln>
             <a:extLst>
               <a:ext uri="{91240B29-F687-4f45-9708-019B960494DF}">
-                <a14:hiddenLine xmlns:a14="http://schemas.microsoft.com/office/drawing/2010/main" xmlns="" w="9525">
+                <a14:hiddenLine xmlns="" xmlns:a14="http://schemas.microsoft.com/office/drawing/2010/main" w="9525">
                   <a:solidFill>
                     <a:srgbClr val="000000"/>
                   </a:solidFill>
@@ -2604,7 +2604,7 @@
             </a:ln>
             <a:extLst>
               <a:ext uri="{91240B29-F687-4f45-9708-019B960494DF}">
-                <a14:hiddenLine xmlns:a14="http://schemas.microsoft.com/office/drawing/2010/main" xmlns="" w="9525">
+                <a14:hiddenLine xmlns="" xmlns:a14="http://schemas.microsoft.com/office/drawing/2010/main" w="9525">
                   <a:solidFill>
                     <a:srgbClr val="000000"/>
                   </a:solidFill>
@@ -2694,7 +2694,7 @@
             </a:ln>
             <a:extLst>
               <a:ext uri="{91240B29-F687-4f45-9708-019B960494DF}">
-                <a14:hiddenLine xmlns:a14="http://schemas.microsoft.com/office/drawing/2010/main" xmlns="" w="9525">
+                <a14:hiddenLine xmlns="" xmlns:a14="http://schemas.microsoft.com/office/drawing/2010/main" w="9525">
                   <a:solidFill>
                     <a:srgbClr val="000000"/>
                   </a:solidFill>
@@ -2728,7 +2728,7 @@
             </a:ln>
             <a:extLst>
               <a:ext uri="{91240B29-F687-4f45-9708-019B960494DF}">
-                <a14:hiddenLine xmlns:a14="http://schemas.microsoft.com/office/drawing/2010/main" xmlns="" w="9525">
+                <a14:hiddenLine xmlns="" xmlns:a14="http://schemas.microsoft.com/office/drawing/2010/main" w="9525">
                   <a:solidFill>
                     <a:srgbClr val="000000"/>
                   </a:solidFill>
@@ -2818,7 +2818,7 @@
             </a:ln>
             <a:extLst>
               <a:ext uri="{91240B29-F687-4f45-9708-019B960494DF}">
-                <a14:hiddenLine xmlns:a14="http://schemas.microsoft.com/office/drawing/2010/main" xmlns="" w="9525">
+                <a14:hiddenLine xmlns="" xmlns:a14="http://schemas.microsoft.com/office/drawing/2010/main" w="9525">
                   <a:solidFill>
                     <a:srgbClr val="000000"/>
                   </a:solidFill>
@@ -2880,7 +2880,7 @@
             </a:ln>
             <a:extLst>
               <a:ext uri="{91240B29-F687-4f45-9708-019B960494DF}">
-                <a14:hiddenLine xmlns:a14="http://schemas.microsoft.com/office/drawing/2010/main" xmlns="" w="9525">
+                <a14:hiddenLine xmlns="" xmlns:a14="http://schemas.microsoft.com/office/drawing/2010/main" w="9525">
                   <a:solidFill>
                     <a:srgbClr val="000000"/>
                   </a:solidFill>
@@ -2942,7 +2942,7 @@
             </a:ln>
             <a:extLst>
               <a:ext uri="{91240B29-F687-4f45-9708-019B960494DF}">
-                <a14:hiddenLine xmlns:a14="http://schemas.microsoft.com/office/drawing/2010/main" xmlns="" w="9525">
+                <a14:hiddenLine xmlns="" xmlns:a14="http://schemas.microsoft.com/office/drawing/2010/main" w="9525">
                   <a:solidFill>
                     <a:srgbClr val="000000"/>
                   </a:solidFill>
@@ -3032,7 +3032,7 @@
             </a:ln>
             <a:extLst>
               <a:ext uri="{91240B29-F687-4f45-9708-019B960494DF}">
-                <a14:hiddenLine xmlns:a14="http://schemas.microsoft.com/office/drawing/2010/main" xmlns="" w="9525">
+                <a14:hiddenLine xmlns="" xmlns:a14="http://schemas.microsoft.com/office/drawing/2010/main" w="9525">
                   <a:solidFill>
                     <a:srgbClr val="000000"/>
                   </a:solidFill>
@@ -3100,7 +3100,7 @@
             </a:ln>
             <a:extLst>
               <a:ext uri="{91240B29-F687-4f45-9708-019B960494DF}">
-                <a14:hiddenLine xmlns:a14="http://schemas.microsoft.com/office/drawing/2010/main" xmlns="" w="9525">
+                <a14:hiddenLine xmlns="" xmlns:a14="http://schemas.microsoft.com/office/drawing/2010/main" w="9525">
                   <a:solidFill>
                     <a:srgbClr val="000000"/>
                   </a:solidFill>
@@ -3162,7 +3162,7 @@
             </a:ln>
             <a:extLst>
               <a:ext uri="{91240B29-F687-4f45-9708-019B960494DF}">
-                <a14:hiddenLine xmlns:a14="http://schemas.microsoft.com/office/drawing/2010/main" xmlns="" w="9525">
+                <a14:hiddenLine xmlns="" xmlns:a14="http://schemas.microsoft.com/office/drawing/2010/main" w="9525">
                   <a:solidFill>
                     <a:srgbClr val="000000"/>
                   </a:solidFill>
@@ -3252,7 +3252,7 @@
             </a:ln>
             <a:extLst>
               <a:ext uri="{91240B29-F687-4f45-9708-019B960494DF}">
-                <a14:hiddenLine xmlns:a14="http://schemas.microsoft.com/office/drawing/2010/main" xmlns="" w="9525">
+                <a14:hiddenLine xmlns="" xmlns:a14="http://schemas.microsoft.com/office/drawing/2010/main" w="9525">
                   <a:solidFill>
                     <a:srgbClr val="000000"/>
                   </a:solidFill>
@@ -3314,7 +3314,7 @@
             </a:ln>
             <a:extLst>
               <a:ext uri="{91240B29-F687-4f45-9708-019B960494DF}">
-                <a14:hiddenLine xmlns:a14="http://schemas.microsoft.com/office/drawing/2010/main" xmlns="" w="9525">
+                <a14:hiddenLine xmlns="" xmlns:a14="http://schemas.microsoft.com/office/drawing/2010/main" w="9525">
                   <a:solidFill>
                     <a:srgbClr val="000000"/>
                   </a:solidFill>
@@ -3404,7 +3404,7 @@
             </a:ln>
             <a:extLst>
               <a:ext uri="{91240B29-F687-4f45-9708-019B960494DF}">
-                <a14:hiddenLine xmlns:a14="http://schemas.microsoft.com/office/drawing/2010/main" xmlns="" w="9525">
+                <a14:hiddenLine xmlns="" xmlns:a14="http://schemas.microsoft.com/office/drawing/2010/main" w="9525">
                   <a:solidFill>
                     <a:srgbClr val="000000"/>
                   </a:solidFill>
@@ -3466,7 +3466,7 @@
             </a:ln>
             <a:extLst>
               <a:ext uri="{91240B29-F687-4f45-9708-019B960494DF}">
-                <a14:hiddenLine xmlns:a14="http://schemas.microsoft.com/office/drawing/2010/main" xmlns="" w="9525">
+                <a14:hiddenLine xmlns="" xmlns:a14="http://schemas.microsoft.com/office/drawing/2010/main" w="9525">
                   <a:solidFill>
                     <a:srgbClr val="000000"/>
                   </a:solidFill>
@@ -3556,7 +3556,7 @@
             </a:ln>
             <a:extLst>
               <a:ext uri="{91240B29-F687-4f45-9708-019B960494DF}">
-                <a14:hiddenLine xmlns:a14="http://schemas.microsoft.com/office/drawing/2010/main" xmlns="" w="9525">
+                <a14:hiddenLine xmlns="" xmlns:a14="http://schemas.microsoft.com/office/drawing/2010/main" w="9525">
                   <a:solidFill>
                     <a:srgbClr val="000000"/>
                   </a:solidFill>
@@ -3590,7 +3590,7 @@
             </a:ln>
             <a:extLst>
               <a:ext uri="{91240B29-F687-4f45-9708-019B960494DF}">
-                <a14:hiddenLine xmlns:a14="http://schemas.microsoft.com/office/drawing/2010/main" xmlns="" w="9525">
+                <a14:hiddenLine xmlns="" xmlns:a14="http://schemas.microsoft.com/office/drawing/2010/main" w="9525">
                   <a:solidFill>
                     <a:srgbClr val="000000"/>
                   </a:solidFill>
@@ -3655,7 +3655,7 @@
             </a:ln>
             <a:extLst>
               <a:ext uri="{91240B29-F687-4f45-9708-019B960494DF}">
-                <a14:hiddenLine xmlns:a14="http://schemas.microsoft.com/office/drawing/2010/main" xmlns="" w="9525">
+                <a14:hiddenLine xmlns="" xmlns:a14="http://schemas.microsoft.com/office/drawing/2010/main" w="9525">
                   <a:solidFill>
                     <a:srgbClr val="000000"/>
                   </a:solidFill>
@@ -3745,7 +3745,7 @@
             </a:ln>
             <a:extLst>
               <a:ext uri="{91240B29-F687-4f45-9708-019B960494DF}">
-                <a14:hiddenLine xmlns:a14="http://schemas.microsoft.com/office/drawing/2010/main" xmlns="" w="9525">
+                <a14:hiddenLine xmlns="" xmlns:a14="http://schemas.microsoft.com/office/drawing/2010/main" w="9525">
                   <a:solidFill>
                     <a:srgbClr val="000000"/>
                   </a:solidFill>
@@ -3807,7 +3807,7 @@
             </a:ln>
             <a:extLst>
               <a:ext uri="{91240B29-F687-4f45-9708-019B960494DF}">
-                <a14:hiddenLine xmlns:a14="http://schemas.microsoft.com/office/drawing/2010/main" xmlns="" w="9525">
+                <a14:hiddenLine xmlns="" xmlns:a14="http://schemas.microsoft.com/office/drawing/2010/main" w="9525">
                   <a:solidFill>
                     <a:srgbClr val="000000"/>
                   </a:solidFill>
@@ -3897,7 +3897,7 @@
             </a:ln>
             <a:extLst>
               <a:ext uri="{91240B29-F687-4f45-9708-019B960494DF}">
-                <a14:hiddenLine xmlns:a14="http://schemas.microsoft.com/office/drawing/2010/main" xmlns="" w="9525">
+                <a14:hiddenLine xmlns="" xmlns:a14="http://schemas.microsoft.com/office/drawing/2010/main" w="9525">
                   <a:solidFill>
                     <a:srgbClr val="000000"/>
                   </a:solidFill>
@@ -3987,7 +3987,7 @@
             </a:ln>
             <a:extLst>
               <a:ext uri="{91240B29-F687-4f45-9708-019B960494DF}">
-                <a14:hiddenLine xmlns:a14="http://schemas.microsoft.com/office/drawing/2010/main" xmlns="" w="9525">
+                <a14:hiddenLine xmlns="" xmlns:a14="http://schemas.microsoft.com/office/drawing/2010/main" w="9525">
                   <a:solidFill>
                     <a:srgbClr val="000000"/>
                   </a:solidFill>
@@ -4052,7 +4052,7 @@
             </a:ln>
             <a:extLst>
               <a:ext uri="{91240B29-F687-4f45-9708-019B960494DF}">
-                <a14:hiddenLine xmlns:a14="http://schemas.microsoft.com/office/drawing/2010/main" xmlns="" w="9525">
+                <a14:hiddenLine xmlns="" xmlns:a14="http://schemas.microsoft.com/office/drawing/2010/main" w="9525">
                   <a:solidFill>
                     <a:srgbClr val="000000"/>
                   </a:solidFill>
@@ -4114,7 +4114,7 @@
             </a:ln>
             <a:extLst>
               <a:ext uri="{91240B29-F687-4f45-9708-019B960494DF}">
-                <a14:hiddenLine xmlns:a14="http://schemas.microsoft.com/office/drawing/2010/main" xmlns="" w="9525">
+                <a14:hiddenLine xmlns="" xmlns:a14="http://schemas.microsoft.com/office/drawing/2010/main" w="9525">
                   <a:solidFill>
                     <a:srgbClr val="000000"/>
                   </a:solidFill>
@@ -4204,7 +4204,7 @@
             </a:ln>
             <a:extLst>
               <a:ext uri="{91240B29-F687-4f45-9708-019B960494DF}">
-                <a14:hiddenLine xmlns:a14="http://schemas.microsoft.com/office/drawing/2010/main" xmlns="" w="9525">
+                <a14:hiddenLine xmlns="" xmlns:a14="http://schemas.microsoft.com/office/drawing/2010/main" w="9525">
                   <a:solidFill>
                     <a:srgbClr val="000000"/>
                   </a:solidFill>
@@ -4294,7 +4294,7 @@
             </a:ln>
             <a:extLst>
               <a:ext uri="{91240B29-F687-4f45-9708-019B960494DF}">
-                <a14:hiddenLine xmlns:a14="http://schemas.microsoft.com/office/drawing/2010/main" xmlns="" w="9525">
+                <a14:hiddenLine xmlns="" xmlns:a14="http://schemas.microsoft.com/office/drawing/2010/main" w="9525">
                   <a:solidFill>
                     <a:srgbClr val="000000"/>
                   </a:solidFill>
@@ -4356,7 +4356,7 @@
             </a:ln>
             <a:extLst>
               <a:ext uri="{91240B29-F687-4f45-9708-019B960494DF}">
-                <a14:hiddenLine xmlns:a14="http://schemas.microsoft.com/office/drawing/2010/main" xmlns="" w="9525">
+                <a14:hiddenLine xmlns="" xmlns:a14="http://schemas.microsoft.com/office/drawing/2010/main" w="9525">
                   <a:solidFill>
                     <a:srgbClr val="000000"/>
                   </a:solidFill>
@@ -4476,7 +4476,7 @@
             </a:ln>
             <a:extLst>
               <a:ext uri="{91240B29-F687-4f45-9708-019B960494DF}">
-                <a14:hiddenLine xmlns:a14="http://schemas.microsoft.com/office/drawing/2010/main" xmlns="" w="9525">
+                <a14:hiddenLine xmlns="" xmlns:a14="http://schemas.microsoft.com/office/drawing/2010/main" w="9525">
                   <a:solidFill>
                     <a:srgbClr val="000000"/>
                   </a:solidFill>
@@ -4544,7 +4544,7 @@
             </a:ln>
             <a:extLst>
               <a:ext uri="{91240B29-F687-4f45-9708-019B960494DF}">
-                <a14:hiddenLine xmlns:a14="http://schemas.microsoft.com/office/drawing/2010/main" xmlns="" w="9525">
+                <a14:hiddenLine xmlns="" xmlns:a14="http://schemas.microsoft.com/office/drawing/2010/main" w="9525">
                   <a:solidFill>
                     <a:srgbClr val="000000"/>
                   </a:solidFill>
@@ -4634,7 +4634,7 @@
             </a:ln>
             <a:extLst>
               <a:ext uri="{91240B29-F687-4f45-9708-019B960494DF}">
-                <a14:hiddenLine xmlns:a14="http://schemas.microsoft.com/office/drawing/2010/main" xmlns="" w="9525">
+                <a14:hiddenLine xmlns="" xmlns:a14="http://schemas.microsoft.com/office/drawing/2010/main" w="9525">
                   <a:solidFill>
                     <a:srgbClr val="000000"/>
                   </a:solidFill>
@@ -4774,7 +4774,7 @@
           <a:p>
             <a:fld id="{123D93BF-0E48-4806-ACDA-050F86EFFD02}" type="datetime1">
               <a:rPr lang="en-US" smtClean="0"/>
-              <a:t>4/14/2018</a:t>
+              <a:t>4/15/2018</a:t>
             </a:fld>
             <a:endParaRPr lang="en-US" dirty="0"/>
           </a:p>
@@ -5039,7 +5039,7 @@
           <a:p>
             <a:fld id="{E4D2E2F6-8FD2-4780-BF7C-448A004F96D2}" type="datetime1">
               <a:rPr lang="en-US" smtClean="0"/>
-              <a:t>4/14/2018</a:t>
+              <a:t>4/15/2018</a:t>
             </a:fld>
             <a:endParaRPr lang="en-US" dirty="0"/>
           </a:p>
@@ -5230,7 +5230,7 @@
           <a:p>
             <a:fld id="{4C33D9B3-CB9E-496F-9EAB-05FC982CBF68}" type="datetime1">
               <a:rPr lang="en-US" smtClean="0"/>
-              <a:t>4/14/2018</a:t>
+              <a:t>4/15/2018</a:t>
             </a:fld>
             <a:endParaRPr lang="en-US" dirty="0"/>
           </a:p>
@@ -5488,7 +5488,7 @@
           <a:p>
             <a:fld id="{3C50C79D-60FB-42D8-82E8-35BEE5823E12}" type="datetime1">
               <a:rPr lang="en-US" smtClean="0"/>
-              <a:t>4/14/2018</a:t>
+              <a:t>4/15/2018</a:t>
             </a:fld>
             <a:endParaRPr lang="en-US" dirty="0"/>
           </a:p>
@@ -5917,7 +5917,7 @@
           <a:p>
             <a:fld id="{F6622CDF-2677-4F9C-94FC-74E623BB587E}" type="datetime1">
               <a:rPr lang="en-US" smtClean="0"/>
-              <a:t>4/14/2018</a:t>
+              <a:t>4/15/2018</a:t>
             </a:fld>
             <a:endParaRPr lang="en-US" dirty="0"/>
           </a:p>
@@ -6458,7 +6458,7 @@
           <a:p>
             <a:fld id="{703AC204-77FA-45D5-99E4-1E572BDA2EF7}" type="datetime1">
               <a:rPr lang="en-US" smtClean="0"/>
-              <a:t>4/14/2018</a:t>
+              <a:t>4/15/2018</a:t>
             </a:fld>
             <a:endParaRPr lang="en-US" dirty="0"/>
           </a:p>
@@ -7173,7 +7173,7 @@
           <a:p>
             <a:fld id="{6B0B2836-F623-482F-8D9B-9268FECDA1F0}" type="datetime1">
               <a:rPr lang="en-US" smtClean="0"/>
-              <a:t>4/14/2018</a:t>
+              <a:t>4/15/2018</a:t>
             </a:fld>
             <a:endParaRPr lang="en-US" dirty="0"/>
           </a:p>
@@ -7338,7 +7338,7 @@
           <a:p>
             <a:fld id="{93CA96EA-5FEF-44DD-9242-B2C16548D4B7}" type="datetime1">
               <a:rPr lang="en-US" smtClean="0"/>
-              <a:t>4/14/2018</a:t>
+              <a:t>4/15/2018</a:t>
             </a:fld>
             <a:endParaRPr lang="en-US" dirty="0"/>
           </a:p>
@@ -7513,7 +7513,7 @@
           <a:p>
             <a:fld id="{064F3615-BA9C-44EC-ACF3-1101EC8E8C17}" type="datetime1">
               <a:rPr lang="en-US" smtClean="0"/>
-              <a:t>4/14/2018</a:t>
+              <a:t>4/15/2018</a:t>
             </a:fld>
             <a:endParaRPr lang="en-US" dirty="0"/>
           </a:p>
@@ -7678,7 +7678,7 @@
           <a:p>
             <a:fld id="{3E2D90C1-56A7-41FB-A8D0-E500925E43F2}" type="datetime1">
               <a:rPr lang="en-US" smtClean="0"/>
-              <a:t>4/14/2018</a:t>
+              <a:t>4/15/2018</a:t>
             </a:fld>
             <a:endParaRPr lang="en-US" dirty="0"/>
           </a:p>
@@ -7923,7 +7923,7 @@
           <a:p>
             <a:fld id="{9F1D243F-124E-4E30-8A16-93F0DB8A81C1}" type="datetime1">
               <a:rPr lang="en-US" smtClean="0"/>
-              <a:t>4/14/2018</a:t>
+              <a:t>4/15/2018</a:t>
             </a:fld>
             <a:endParaRPr lang="en-US" dirty="0"/>
           </a:p>
@@ -8150,7 +8150,7 @@
           <a:p>
             <a:fld id="{741F534B-592F-49E2-98C3-F771841B2568}" type="datetime1">
               <a:rPr lang="en-US" smtClean="0"/>
-              <a:t>4/14/2018</a:t>
+              <a:t>4/15/2018</a:t>
             </a:fld>
             <a:endParaRPr lang="en-US" dirty="0"/>
           </a:p>
@@ -8526,7 +8526,7 @@
           <a:p>
             <a:fld id="{24D0D35C-D667-4151-B64A-39AD5875BB3C}" type="datetime1">
               <a:rPr lang="en-US" smtClean="0"/>
-              <a:t>4/14/2018</a:t>
+              <a:t>4/15/2018</a:t>
             </a:fld>
             <a:endParaRPr lang="en-US" dirty="0"/>
           </a:p>
@@ -8639,7 +8639,7 @@
           <a:p>
             <a:fld id="{03C9ED46-37CD-441C-8FE1-2C042A964BD0}" type="datetime1">
               <a:rPr lang="en-US" smtClean="0"/>
-              <a:t>4/14/2018</a:t>
+              <a:t>4/15/2018</a:t>
             </a:fld>
             <a:endParaRPr lang="en-US" dirty="0"/>
           </a:p>
@@ -8729,7 +8729,7 @@
           <a:p>
             <a:fld id="{914D2B08-2345-4A0F-91EF-7583E9FBEDC8}" type="datetime1">
               <a:rPr lang="en-US" smtClean="0"/>
-              <a:t>4/14/2018</a:t>
+              <a:t>4/15/2018</a:t>
             </a:fld>
             <a:endParaRPr lang="en-US" dirty="0"/>
           </a:p>
@@ -8973,7 +8973,7 @@
           <a:p>
             <a:fld id="{5DBFF6E4-9C00-40E0-8888-0111B2450E24}" type="datetime1">
               <a:rPr lang="en-US" smtClean="0"/>
-              <a:t>4/14/2018</a:t>
+              <a:t>4/15/2018</a:t>
             </a:fld>
             <a:endParaRPr lang="en-US" dirty="0"/>
           </a:p>
@@ -9248,7 +9248,7 @@
           <a:p>
             <a:fld id="{817C564B-6585-4248-ABEB-B271FF2627E2}" type="datetime1">
               <a:rPr lang="en-US" smtClean="0"/>
-              <a:t>4/14/2018</a:t>
+              <a:t>4/15/2018</a:t>
             </a:fld>
             <a:endParaRPr lang="en-US" dirty="0"/>
           </a:p>
@@ -9366,7 +9366,7 @@
           <a:noFill/>
           <a:extLst>
             <a:ext uri="{909E8E84-426E-40dd-AFC4-6F175D3DCCD1}">
-              <a14:hiddenFill xmlns:a14="http://schemas.microsoft.com/office/drawing/2010/main" xmlns="">
+              <a14:hiddenFill xmlns="" xmlns:a14="http://schemas.microsoft.com/office/drawing/2010/main">
                 <a:solidFill>
                   <a:srgbClr val="FFFFFF"/>
                 </a:solidFill>
@@ -9440,7 +9440,7 @@
               </a:ln>
               <a:extLst>
                 <a:ext uri="{91240B29-F687-4f45-9708-019B960494DF}">
-                  <a14:hiddenLine xmlns:a14="http://schemas.microsoft.com/office/drawing/2010/main" xmlns="" w="9525">
+                  <a14:hiddenLine xmlns="" xmlns:a14="http://schemas.microsoft.com/office/drawing/2010/main" w="9525">
                     <a:solidFill>
                       <a:srgbClr val="000000"/>
                     </a:solidFill>
@@ -9530,7 +9530,7 @@
               </a:ln>
               <a:extLst>
                 <a:ext uri="{91240B29-F687-4f45-9708-019B960494DF}">
-                  <a14:hiddenLine xmlns:a14="http://schemas.microsoft.com/office/drawing/2010/main" xmlns="" w="9525">
+                  <a14:hiddenLine xmlns="" xmlns:a14="http://schemas.microsoft.com/office/drawing/2010/main" w="9525">
                     <a:solidFill>
                       <a:srgbClr val="000000"/>
                     </a:solidFill>
@@ -9620,7 +9620,7 @@
               </a:ln>
               <a:extLst>
                 <a:ext uri="{91240B29-F687-4f45-9708-019B960494DF}">
-                  <a14:hiddenLine xmlns:a14="http://schemas.microsoft.com/office/drawing/2010/main" xmlns="" w="9525">
+                  <a14:hiddenLine xmlns="" xmlns:a14="http://schemas.microsoft.com/office/drawing/2010/main" w="9525">
                     <a:solidFill>
                       <a:srgbClr val="000000"/>
                     </a:solidFill>
@@ -9682,7 +9682,7 @@
               </a:ln>
               <a:extLst>
                 <a:ext uri="{91240B29-F687-4f45-9708-019B960494DF}">
-                  <a14:hiddenLine xmlns:a14="http://schemas.microsoft.com/office/drawing/2010/main" xmlns="" w="9525">
+                  <a14:hiddenLine xmlns="" xmlns:a14="http://schemas.microsoft.com/office/drawing/2010/main" w="9525">
                     <a:solidFill>
                       <a:srgbClr val="000000"/>
                     </a:solidFill>
@@ -9772,7 +9772,7 @@
               </a:ln>
               <a:extLst>
                 <a:ext uri="{91240B29-F687-4f45-9708-019B960494DF}">
-                  <a14:hiddenLine xmlns:a14="http://schemas.microsoft.com/office/drawing/2010/main" xmlns="" w="9525">
+                  <a14:hiddenLine xmlns="" xmlns:a14="http://schemas.microsoft.com/office/drawing/2010/main" w="9525">
                     <a:solidFill>
                       <a:srgbClr val="000000"/>
                     </a:solidFill>
@@ -9834,7 +9834,7 @@
               </a:ln>
               <a:extLst>
                 <a:ext uri="{91240B29-F687-4f45-9708-019B960494DF}">
-                  <a14:hiddenLine xmlns:a14="http://schemas.microsoft.com/office/drawing/2010/main" xmlns="" w="9525">
+                  <a14:hiddenLine xmlns="" xmlns:a14="http://schemas.microsoft.com/office/drawing/2010/main" w="9525">
                     <a:solidFill>
                       <a:srgbClr val="000000"/>
                     </a:solidFill>
@@ -9896,7 +9896,7 @@
               </a:ln>
               <a:extLst>
                 <a:ext uri="{91240B29-F687-4f45-9708-019B960494DF}">
-                  <a14:hiddenLine xmlns:a14="http://schemas.microsoft.com/office/drawing/2010/main" xmlns="" w="9525">
+                  <a14:hiddenLine xmlns="" xmlns:a14="http://schemas.microsoft.com/office/drawing/2010/main" w="9525">
                     <a:solidFill>
                       <a:srgbClr val="000000"/>
                     </a:solidFill>
@@ -9986,7 +9986,7 @@
               </a:ln>
               <a:extLst>
                 <a:ext uri="{91240B29-F687-4f45-9708-019B960494DF}">
-                  <a14:hiddenLine xmlns:a14="http://schemas.microsoft.com/office/drawing/2010/main" xmlns="" w="9525">
+                  <a14:hiddenLine xmlns="" xmlns:a14="http://schemas.microsoft.com/office/drawing/2010/main" w="9525">
                     <a:solidFill>
                       <a:srgbClr val="000000"/>
                     </a:solidFill>
@@ -10076,7 +10076,7 @@
               </a:ln>
               <a:extLst>
                 <a:ext uri="{91240B29-F687-4f45-9708-019B960494DF}">
-                  <a14:hiddenLine xmlns:a14="http://schemas.microsoft.com/office/drawing/2010/main" xmlns="" w="9525">
+                  <a14:hiddenLine xmlns="" xmlns:a14="http://schemas.microsoft.com/office/drawing/2010/main" w="9525">
                     <a:solidFill>
                       <a:srgbClr val="000000"/>
                     </a:solidFill>
@@ -10138,7 +10138,7 @@
               </a:ln>
               <a:extLst>
                 <a:ext uri="{91240B29-F687-4f45-9708-019B960494DF}">
-                  <a14:hiddenLine xmlns:a14="http://schemas.microsoft.com/office/drawing/2010/main" xmlns="" w="9525">
+                  <a14:hiddenLine xmlns="" xmlns:a14="http://schemas.microsoft.com/office/drawing/2010/main" w="9525">
                     <a:solidFill>
                       <a:srgbClr val="000000"/>
                     </a:solidFill>
@@ -10248,7 +10248,7 @@
               </a:ln>
               <a:extLst>
                 <a:ext uri="{91240B29-F687-4f45-9708-019B960494DF}">
-                  <a14:hiddenLine xmlns:a14="http://schemas.microsoft.com/office/drawing/2010/main" xmlns="" w="9525">
+                  <a14:hiddenLine xmlns="" xmlns:a14="http://schemas.microsoft.com/office/drawing/2010/main" w="9525">
                     <a:solidFill>
                       <a:srgbClr val="000000"/>
                     </a:solidFill>
@@ -10332,7 +10332,7 @@
               </a:ln>
               <a:extLst>
                 <a:ext uri="{91240B29-F687-4f45-9708-019B960494DF}">
-                  <a14:hiddenLine xmlns:a14="http://schemas.microsoft.com/office/drawing/2010/main" xmlns="" w="9525">
+                  <a14:hiddenLine xmlns="" xmlns:a14="http://schemas.microsoft.com/office/drawing/2010/main" w="9525">
                     <a:solidFill>
                       <a:srgbClr val="000000"/>
                     </a:solidFill>
@@ -10394,7 +10394,7 @@
               </a:ln>
               <a:extLst>
                 <a:ext uri="{91240B29-F687-4f45-9708-019B960494DF}">
-                  <a14:hiddenLine xmlns:a14="http://schemas.microsoft.com/office/drawing/2010/main" xmlns="" w="9525">
+                  <a14:hiddenLine xmlns="" xmlns:a14="http://schemas.microsoft.com/office/drawing/2010/main" w="9525">
                     <a:solidFill>
                       <a:srgbClr val="000000"/>
                     </a:solidFill>
@@ -10456,7 +10456,7 @@
               </a:ln>
               <a:extLst>
                 <a:ext uri="{91240B29-F687-4f45-9708-019B960494DF}">
-                  <a14:hiddenLine xmlns:a14="http://schemas.microsoft.com/office/drawing/2010/main" xmlns="" w="9525">
+                  <a14:hiddenLine xmlns="" xmlns:a14="http://schemas.microsoft.com/office/drawing/2010/main" w="9525">
                     <a:solidFill>
                       <a:srgbClr val="000000"/>
                     </a:solidFill>
@@ -10546,7 +10546,7 @@
               </a:ln>
               <a:extLst>
                 <a:ext uri="{91240B29-F687-4f45-9708-019B960494DF}">
-                  <a14:hiddenLine xmlns:a14="http://schemas.microsoft.com/office/drawing/2010/main" xmlns="" w="9525">
+                  <a14:hiddenLine xmlns="" xmlns:a14="http://schemas.microsoft.com/office/drawing/2010/main" w="9525">
                     <a:solidFill>
                       <a:srgbClr val="000000"/>
                     </a:solidFill>
@@ -10580,7 +10580,7 @@
               </a:ln>
               <a:extLst>
                 <a:ext uri="{91240B29-F687-4f45-9708-019B960494DF}">
-                  <a14:hiddenLine xmlns:a14="http://schemas.microsoft.com/office/drawing/2010/main" xmlns="" w="9525">
+                  <a14:hiddenLine xmlns="" xmlns:a14="http://schemas.microsoft.com/office/drawing/2010/main" w="9525">
                     <a:solidFill>
                       <a:srgbClr val="000000"/>
                     </a:solidFill>
@@ -10645,7 +10645,7 @@
               </a:ln>
               <a:extLst>
                 <a:ext uri="{91240B29-F687-4f45-9708-019B960494DF}">
-                  <a14:hiddenLine xmlns:a14="http://schemas.microsoft.com/office/drawing/2010/main" xmlns="" w="9525">
+                  <a14:hiddenLine xmlns="" xmlns:a14="http://schemas.microsoft.com/office/drawing/2010/main" w="9525">
                     <a:solidFill>
                       <a:srgbClr val="000000"/>
                     </a:solidFill>
@@ -10735,7 +10735,7 @@
               </a:ln>
               <a:extLst>
                 <a:ext uri="{91240B29-F687-4f45-9708-019B960494DF}">
-                  <a14:hiddenLine xmlns:a14="http://schemas.microsoft.com/office/drawing/2010/main" xmlns="" w="9525">
+                  <a14:hiddenLine xmlns="" xmlns:a14="http://schemas.microsoft.com/office/drawing/2010/main" w="9525">
                     <a:solidFill>
                       <a:srgbClr val="000000"/>
                     </a:solidFill>
@@ -10797,7 +10797,7 @@
               </a:ln>
               <a:extLst>
                 <a:ext uri="{91240B29-F687-4f45-9708-019B960494DF}">
-                  <a14:hiddenLine xmlns:a14="http://schemas.microsoft.com/office/drawing/2010/main" xmlns="" w="9525">
+                  <a14:hiddenLine xmlns="" xmlns:a14="http://schemas.microsoft.com/office/drawing/2010/main" w="9525">
                     <a:solidFill>
                       <a:srgbClr val="000000"/>
                     </a:solidFill>
@@ -10887,7 +10887,7 @@
               </a:ln>
               <a:extLst>
                 <a:ext uri="{91240B29-F687-4f45-9708-019B960494DF}">
-                  <a14:hiddenLine xmlns:a14="http://schemas.microsoft.com/office/drawing/2010/main" xmlns="" w="9525">
+                  <a14:hiddenLine xmlns="" xmlns:a14="http://schemas.microsoft.com/office/drawing/2010/main" w="9525">
                     <a:solidFill>
                       <a:srgbClr val="000000"/>
                     </a:solidFill>
@@ -10952,7 +10952,7 @@
               </a:ln>
               <a:extLst>
                 <a:ext uri="{91240B29-F687-4f45-9708-019B960494DF}">
-                  <a14:hiddenLine xmlns:a14="http://schemas.microsoft.com/office/drawing/2010/main" xmlns="" w="9525">
+                  <a14:hiddenLine xmlns="" xmlns:a14="http://schemas.microsoft.com/office/drawing/2010/main" w="9525">
                     <a:solidFill>
                       <a:srgbClr val="000000"/>
                     </a:solidFill>
@@ -11014,7 +11014,7 @@
               </a:ln>
               <a:extLst>
                 <a:ext uri="{91240B29-F687-4f45-9708-019B960494DF}">
-                  <a14:hiddenLine xmlns:a14="http://schemas.microsoft.com/office/drawing/2010/main" xmlns="" w="9525">
+                  <a14:hiddenLine xmlns="" xmlns:a14="http://schemas.microsoft.com/office/drawing/2010/main" w="9525">
                     <a:solidFill>
                       <a:srgbClr val="000000"/>
                     </a:solidFill>
@@ -11104,7 +11104,7 @@
               </a:ln>
               <a:extLst>
                 <a:ext uri="{91240B29-F687-4f45-9708-019B960494DF}">
-                  <a14:hiddenLine xmlns:a14="http://schemas.microsoft.com/office/drawing/2010/main" xmlns="" w="9525">
+                  <a14:hiddenLine xmlns="" xmlns:a14="http://schemas.microsoft.com/office/drawing/2010/main" w="9525">
                     <a:solidFill>
                       <a:srgbClr val="000000"/>
                     </a:solidFill>
@@ -11194,7 +11194,7 @@
               </a:ln>
               <a:extLst>
                 <a:ext uri="{91240B29-F687-4f45-9708-019B960494DF}">
-                  <a14:hiddenLine xmlns:a14="http://schemas.microsoft.com/office/drawing/2010/main" xmlns="" w="9525">
+                  <a14:hiddenLine xmlns="" xmlns:a14="http://schemas.microsoft.com/office/drawing/2010/main" w="9525">
                     <a:solidFill>
                       <a:srgbClr val="000000"/>
                     </a:solidFill>
@@ -11259,7 +11259,7 @@
               </a:ln>
               <a:extLst>
                 <a:ext uri="{91240B29-F687-4f45-9708-019B960494DF}">
-                  <a14:hiddenLine xmlns:a14="http://schemas.microsoft.com/office/drawing/2010/main" xmlns="" w="9525">
+                  <a14:hiddenLine xmlns="" xmlns:a14="http://schemas.microsoft.com/office/drawing/2010/main" w="9525">
                     <a:solidFill>
                       <a:srgbClr val="000000"/>
                     </a:solidFill>
@@ -11379,7 +11379,7 @@
               </a:ln>
               <a:extLst>
                 <a:ext uri="{91240B29-F687-4f45-9708-019B960494DF}">
-                  <a14:hiddenLine xmlns:a14="http://schemas.microsoft.com/office/drawing/2010/main" xmlns="" w="9525">
+                  <a14:hiddenLine xmlns="" xmlns:a14="http://schemas.microsoft.com/office/drawing/2010/main" w="9525">
                     <a:solidFill>
                       <a:srgbClr val="000000"/>
                     </a:solidFill>
@@ -11477,7 +11477,7 @@
               </a:ln>
               <a:extLst>
                 <a:ext uri="{91240B29-F687-4f45-9708-019B960494DF}">
-                  <a14:hiddenLine xmlns:a14="http://schemas.microsoft.com/office/drawing/2010/main" xmlns="" w="9525">
+                  <a14:hiddenLine xmlns="" xmlns:a14="http://schemas.microsoft.com/office/drawing/2010/main" w="9525">
                     <a:solidFill>
                       <a:srgbClr val="000000"/>
                     </a:solidFill>
@@ -11592,7 +11592,7 @@
               </a:ln>
               <a:extLst>
                 <a:ext uri="{91240B29-F687-4f45-9708-019B960494DF}">
-                  <a14:hiddenLine xmlns:a14="http://schemas.microsoft.com/office/drawing/2010/main" xmlns="" w="9525">
+                  <a14:hiddenLine xmlns="" xmlns:a14="http://schemas.microsoft.com/office/drawing/2010/main" w="9525">
                     <a:solidFill>
                       <a:srgbClr val="000000"/>
                     </a:solidFill>
@@ -11682,7 +11682,7 @@
               </a:ln>
               <a:extLst>
                 <a:ext uri="{91240B29-F687-4f45-9708-019B960494DF}">
-                  <a14:hiddenLine xmlns:a14="http://schemas.microsoft.com/office/drawing/2010/main" xmlns="" w="9525">
+                  <a14:hiddenLine xmlns="" xmlns:a14="http://schemas.microsoft.com/office/drawing/2010/main" w="9525">
                     <a:solidFill>
                       <a:srgbClr val="000000"/>
                     </a:solidFill>
@@ -11747,7 +11747,7 @@
               </a:ln>
               <a:extLst>
                 <a:ext uri="{91240B29-F687-4f45-9708-019B960494DF}">
-                  <a14:hiddenLine xmlns:a14="http://schemas.microsoft.com/office/drawing/2010/main" xmlns="" w="9525">
+                  <a14:hiddenLine xmlns="" xmlns:a14="http://schemas.microsoft.com/office/drawing/2010/main" w="9525">
                     <a:solidFill>
                       <a:srgbClr val="000000"/>
                     </a:solidFill>
@@ -11837,7 +11837,7 @@
               </a:ln>
               <a:extLst>
                 <a:ext uri="{91240B29-F687-4f45-9708-019B960494DF}">
-                  <a14:hiddenLine xmlns:a14="http://schemas.microsoft.com/office/drawing/2010/main" xmlns="" w="9525">
+                  <a14:hiddenLine xmlns="" xmlns:a14="http://schemas.microsoft.com/office/drawing/2010/main" w="9525">
                     <a:solidFill>
                       <a:srgbClr val="000000"/>
                     </a:solidFill>
@@ -11905,7 +11905,7 @@
               </a:ln>
               <a:extLst>
                 <a:ext uri="{91240B29-F687-4f45-9708-019B960494DF}">
-                  <a14:hiddenLine xmlns:a14="http://schemas.microsoft.com/office/drawing/2010/main" xmlns="" w="9525">
+                  <a14:hiddenLine xmlns="" xmlns:a14="http://schemas.microsoft.com/office/drawing/2010/main" w="9525">
                     <a:solidFill>
                       <a:srgbClr val="000000"/>
                     </a:solidFill>
@@ -11995,7 +11995,7 @@
               </a:ln>
               <a:extLst>
                 <a:ext uri="{91240B29-F687-4f45-9708-019B960494DF}">
-                  <a14:hiddenLine xmlns:a14="http://schemas.microsoft.com/office/drawing/2010/main" xmlns="" w="9525">
+                  <a14:hiddenLine xmlns="" xmlns:a14="http://schemas.microsoft.com/office/drawing/2010/main" w="9525">
                     <a:solidFill>
                       <a:srgbClr val="000000"/>
                     </a:solidFill>
@@ -12063,7 +12063,7 @@
               </a:ln>
               <a:extLst>
                 <a:ext uri="{91240B29-F687-4f45-9708-019B960494DF}">
-                  <a14:hiddenLine xmlns:a14="http://schemas.microsoft.com/office/drawing/2010/main" xmlns="" w="9525">
+                  <a14:hiddenLine xmlns="" xmlns:a14="http://schemas.microsoft.com/office/drawing/2010/main" w="9525">
                     <a:solidFill>
                       <a:srgbClr val="000000"/>
                     </a:solidFill>
@@ -12153,7 +12153,7 @@
               </a:ln>
               <a:extLst>
                 <a:ext uri="{91240B29-F687-4f45-9708-019B960494DF}">
-                  <a14:hiddenLine xmlns:a14="http://schemas.microsoft.com/office/drawing/2010/main" xmlns="" w="9525">
+                  <a14:hiddenLine xmlns="" xmlns:a14="http://schemas.microsoft.com/office/drawing/2010/main" w="9525">
                     <a:solidFill>
                       <a:srgbClr val="000000"/>
                     </a:solidFill>
@@ -12187,7 +12187,7 @@
               </a:ln>
               <a:extLst>
                 <a:ext uri="{91240B29-F687-4f45-9708-019B960494DF}">
-                  <a14:hiddenLine xmlns:a14="http://schemas.microsoft.com/office/drawing/2010/main" xmlns="" w="9525">
+                  <a14:hiddenLine xmlns="" xmlns:a14="http://schemas.microsoft.com/office/drawing/2010/main" w="9525">
                     <a:solidFill>
                       <a:srgbClr val="000000"/>
                     </a:solidFill>
@@ -12327,7 +12327,7 @@
           <a:p>
             <a:fld id="{B08E032C-E9B4-400F-8610-EE0BF813F7C2}" type="datetime1">
               <a:rPr lang="en-US" smtClean="0"/>
-              <a:t>4/14/2018</a:t>
+              <a:t>4/15/2018</a:t>
             </a:fld>
             <a:endParaRPr lang="en-US" dirty="0"/>
           </a:p>
@@ -14566,7 +14566,15 @@
             </a:r>
             <a:r>
               <a:rPr lang="fr-FR" sz="2200" dirty="0"/>
-              <a:t>pour ajouter des annonces</a:t>
+              <a:t>pour ajouter des annonces (</a:t>
+            </a:r>
+            <a:r>
+              <a:rPr lang="fr-FR" sz="2200" dirty="0" err="1"/>
+              <a:t>PhpSpreadsheet</a:t>
+            </a:r>
+            <a:r>
+              <a:rPr lang="fr-FR" sz="2200" dirty="0"/>
+              <a:t>)</a:t>
             </a:r>
           </a:p>
           <a:p>

</xml_diff>